<commit_message>
all-slides.pdf code.zip introduction.pdf introduction.pptx lambda.pdf lambda.pptx
</commit_message>
<xml_diff>
--- a/ipsa/slides/lambda.pptx
+++ b/ipsa/slides/lambda.pptx
@@ -138,6 +138,161 @@
 <file path=ppt/changesInfos/changesInfo1.xml><?xml version="1.0" encoding="utf-8"?>
 <pc:chgInfo xmlns:a="http://schemas.openxmlformats.org/drawingml/2006/main" xmlns:r="http://schemas.openxmlformats.org/officeDocument/2006/relationships" xmlns:ac="http://schemas.microsoft.com/office/drawing/2013/main/command" xmlns:pc="http://schemas.microsoft.com/office/powerpoint/2013/main/command">
   <pc:docChgLst>
+    <pc:chgData name="Gerth Stølting" userId="04ef4784-6591-4f86-a140-f5c3b108582a" providerId="ADAL" clId="{734C3A8B-8F67-4AB6-A6C8-CFD1AC566D4B}"/>
+    <pc:docChg chg="modSld sldOrd">
+      <pc:chgData name="Gerth Stølting" userId="04ef4784-6591-4f86-a140-f5c3b108582a" providerId="ADAL" clId="{734C3A8B-8F67-4AB6-A6C8-CFD1AC566D4B}" dt="2023-03-06T07:56:07.490" v="3"/>
+      <pc:docMkLst>
+        <pc:docMk/>
+      </pc:docMkLst>
+      <pc:sldChg chg="ord">
+        <pc:chgData name="Gerth Stølting" userId="04ef4784-6591-4f86-a140-f5c3b108582a" providerId="ADAL" clId="{734C3A8B-8F67-4AB6-A6C8-CFD1AC566D4B}" dt="2023-03-06T07:56:07.490" v="3"/>
+        <pc:sldMkLst>
+          <pc:docMk/>
+          <pc:sldMk cId="801879974" sldId="510"/>
+        </pc:sldMkLst>
+      </pc:sldChg>
+    </pc:docChg>
+  </pc:docChgLst>
+  <pc:docChgLst>
+    <pc:chgData name="Gerth Stølting Brodal" userId="04ef4784-6591-4f86-a140-f5c3b108582a" providerId="ADAL" clId="{D95B4D7F-02F6-463D-98C8-C6F480714164}"/>
+    <pc:docChg chg="custSel modSld">
+      <pc:chgData name="Gerth Stølting Brodal" userId="04ef4784-6591-4f86-a140-f5c3b108582a" providerId="ADAL" clId="{D95B4D7F-02F6-463D-98C8-C6F480714164}" dt="2024-10-27T08:04:50.916" v="162" actId="20577"/>
+      <pc:docMkLst>
+        <pc:docMk/>
+      </pc:docMkLst>
+      <pc:sldChg chg="modNotesTx">
+        <pc:chgData name="Gerth Stølting Brodal" userId="04ef4784-6591-4f86-a140-f5c3b108582a" providerId="ADAL" clId="{D95B4D7F-02F6-463D-98C8-C6F480714164}" dt="2024-10-27T08:04:50.916" v="162" actId="20577"/>
+        <pc:sldMkLst>
+          <pc:docMk/>
+          <pc:sldMk cId="4193267438" sldId="625"/>
+        </pc:sldMkLst>
+      </pc:sldChg>
+    </pc:docChg>
+  </pc:docChgLst>
+  <pc:docChgLst>
+    <pc:chgData name="Gerth Stølting Brodal" userId="04ef4784-6591-4f86-a140-f5c3b108582a" providerId="ADAL" clId="{93408A75-2116-4BC9-8B13-FD5E23B56413}"/>
+    <pc:docChg chg="undo custSel addSld delSld modSld">
+      <pc:chgData name="Gerth Stølting Brodal" userId="04ef4784-6591-4f86-a140-f5c3b108582a" providerId="ADAL" clId="{93408A75-2116-4BC9-8B13-FD5E23B56413}" dt="2022-03-02T12:39:09.586" v="1511" actId="20577"/>
+      <pc:docMkLst>
+        <pc:docMk/>
+      </pc:docMkLst>
+      <pc:sldChg chg="modSp mod">
+        <pc:chgData name="Gerth Stølting Brodal" userId="04ef4784-6591-4f86-a140-f5c3b108582a" providerId="ADAL" clId="{93408A75-2116-4BC9-8B13-FD5E23B56413}" dt="2022-03-02T12:21:43.829" v="1493" actId="20577"/>
+        <pc:sldMkLst>
+          <pc:docMk/>
+          <pc:sldMk cId="2401375598" sldId="616"/>
+        </pc:sldMkLst>
+        <pc:spChg chg="mod">
+          <ac:chgData name="Gerth Stølting Brodal" userId="04ef4784-6591-4f86-a140-f5c3b108582a" providerId="ADAL" clId="{93408A75-2116-4BC9-8B13-FD5E23B56413}" dt="2022-03-02T12:21:43.829" v="1493" actId="20577"/>
+          <ac:spMkLst>
+            <pc:docMk/>
+            <pc:sldMk cId="2401375598" sldId="616"/>
+            <ac:spMk id="3" creationId="{00000000-0000-0000-0000-000000000000}"/>
+          </ac:spMkLst>
+        </pc:spChg>
+      </pc:sldChg>
+      <pc:sldChg chg="modNotesTx">
+        <pc:chgData name="Gerth Stølting Brodal" userId="04ef4784-6591-4f86-a140-f5c3b108582a" providerId="ADAL" clId="{93408A75-2116-4BC9-8B13-FD5E23B56413}" dt="2022-03-01T20:13:10.896" v="1485" actId="20577"/>
+        <pc:sldMkLst>
+          <pc:docMk/>
+          <pc:sldMk cId="2117179183" sldId="626"/>
+        </pc:sldMkLst>
+      </pc:sldChg>
+      <pc:sldChg chg="del">
+        <pc:chgData name="Gerth Stølting Brodal" userId="04ef4784-6591-4f86-a140-f5c3b108582a" providerId="ADAL" clId="{93408A75-2116-4BC9-8B13-FD5E23B56413}" dt="2022-02-22T20:11:02.761" v="59" actId="47"/>
+        <pc:sldMkLst>
+          <pc:docMk/>
+          <pc:sldMk cId="649010544" sldId="627"/>
+        </pc:sldMkLst>
+      </pc:sldChg>
+      <pc:sldChg chg="addSp delSp modSp mod">
+        <pc:chgData name="Gerth Stølting Brodal" userId="04ef4784-6591-4f86-a140-f5c3b108582a" providerId="ADAL" clId="{93408A75-2116-4BC9-8B13-FD5E23B56413}" dt="2022-03-02T12:39:09.586" v="1511" actId="20577"/>
+        <pc:sldMkLst>
+          <pc:docMk/>
+          <pc:sldMk cId="256353597" sldId="628"/>
+        </pc:sldMkLst>
+        <pc:spChg chg="mod">
+          <ac:chgData name="Gerth Stølting Brodal" userId="04ef4784-6591-4f86-a140-f5c3b108582a" providerId="ADAL" clId="{93408A75-2116-4BC9-8B13-FD5E23B56413}" dt="2022-03-02T12:38:40.366" v="1499" actId="1076"/>
+          <ac:spMkLst>
+            <pc:docMk/>
+            <pc:sldMk cId="256353597" sldId="628"/>
+            <ac:spMk id="2" creationId="{00000000-0000-0000-0000-000000000000}"/>
+          </ac:spMkLst>
+        </pc:spChg>
+        <pc:spChg chg="add del">
+          <ac:chgData name="Gerth Stølting Brodal" userId="04ef4784-6591-4f86-a140-f5c3b108582a" providerId="ADAL" clId="{93408A75-2116-4BC9-8B13-FD5E23B56413}" dt="2022-03-02T12:38:30.715" v="1495"/>
+          <ac:spMkLst>
+            <pc:docMk/>
+            <pc:sldMk cId="256353597" sldId="628"/>
+            <ac:spMk id="3" creationId="{E7B59981-4DAC-4311-B3B1-F66DA93A35AC}"/>
+          </ac:spMkLst>
+        </pc:spChg>
+        <pc:spChg chg="add mod">
+          <ac:chgData name="Gerth Stølting Brodal" userId="04ef4784-6591-4f86-a140-f5c3b108582a" providerId="ADAL" clId="{93408A75-2116-4BC9-8B13-FD5E23B56413}" dt="2022-03-02T12:39:09.586" v="1511" actId="20577"/>
+          <ac:spMkLst>
+            <pc:docMk/>
+            <pc:sldMk cId="256353597" sldId="628"/>
+            <ac:spMk id="5" creationId="{992BE75F-A1CA-4720-829E-E6D5124EB17C}"/>
+          </ac:spMkLst>
+        </pc:spChg>
+        <pc:graphicFrameChg chg="mod">
+          <ac:chgData name="Gerth Stølting Brodal" userId="04ef4784-6591-4f86-a140-f5c3b108582a" providerId="ADAL" clId="{93408A75-2116-4BC9-8B13-FD5E23B56413}" dt="2022-03-02T12:38:33.659" v="1496"/>
+          <ac:graphicFrameMkLst>
+            <pc:docMk/>
+            <pc:sldMk cId="256353597" sldId="628"/>
+            <ac:graphicFrameMk id="4" creationId="{00000000-0000-0000-0000-000000000000}"/>
+          </ac:graphicFrameMkLst>
+        </pc:graphicFrameChg>
+      </pc:sldChg>
+      <pc:sldChg chg="modNotesTx">
+        <pc:chgData name="Gerth Stølting Brodal" userId="04ef4784-6591-4f86-a140-f5c3b108582a" providerId="ADAL" clId="{93408A75-2116-4BC9-8B13-FD5E23B56413}" dt="2022-02-22T20:09:56.624" v="58" actId="20577"/>
+        <pc:sldMkLst>
+          <pc:docMk/>
+          <pc:sldMk cId="110934910" sldId="629"/>
+        </pc:sldMkLst>
+      </pc:sldChg>
+      <pc:sldChg chg="modSp add mod modNotesTx">
+        <pc:chgData name="Gerth Stølting Brodal" userId="04ef4784-6591-4f86-a140-f5c3b108582a" providerId="ADAL" clId="{93408A75-2116-4BC9-8B13-FD5E23B56413}" dt="2022-03-01T20:08:28.148" v="1381" actId="20577"/>
+        <pc:sldMkLst>
+          <pc:docMk/>
+          <pc:sldMk cId="2011582212" sldId="630"/>
+        </pc:sldMkLst>
+        <pc:spChg chg="mod">
+          <ac:chgData name="Gerth Stølting Brodal" userId="04ef4784-6591-4f86-a140-f5c3b108582a" providerId="ADAL" clId="{93408A75-2116-4BC9-8B13-FD5E23B56413}" dt="2022-02-22T20:58:28.934" v="862" actId="1035"/>
+          <ac:spMkLst>
+            <pc:docMk/>
+            <pc:sldMk cId="2011582212" sldId="630"/>
+            <ac:spMk id="2" creationId="{00000000-0000-0000-0000-000000000000}"/>
+          </ac:spMkLst>
+        </pc:spChg>
+        <pc:spChg chg="mod">
+          <ac:chgData name="Gerth Stølting Brodal" userId="04ef4784-6591-4f86-a140-f5c3b108582a" providerId="ADAL" clId="{93408A75-2116-4BC9-8B13-FD5E23B56413}" dt="2022-02-22T21:11:42.926" v="1378" actId="20577"/>
+          <ac:spMkLst>
+            <pc:docMk/>
+            <pc:sldMk cId="2011582212" sldId="630"/>
+            <ac:spMk id="3" creationId="{00000000-0000-0000-0000-000000000000}"/>
+          </ac:spMkLst>
+        </pc:spChg>
+        <pc:spChg chg="mod">
+          <ac:chgData name="Gerth Stølting Brodal" userId="04ef4784-6591-4f86-a140-f5c3b108582a" providerId="ADAL" clId="{93408A75-2116-4BC9-8B13-FD5E23B56413}" dt="2022-02-22T20:49:42.922" v="594" actId="20577"/>
+          <ac:spMkLst>
+            <pc:docMk/>
+            <pc:sldMk cId="2011582212" sldId="630"/>
+            <ac:spMk id="5" creationId="{00000000-0000-0000-0000-000000000000}"/>
+          </ac:spMkLst>
+        </pc:spChg>
+        <pc:graphicFrameChg chg="mod modGraphic">
+          <ac:chgData name="Gerth Stølting Brodal" userId="04ef4784-6591-4f86-a140-f5c3b108582a" providerId="ADAL" clId="{93408A75-2116-4BC9-8B13-FD5E23B56413}" dt="2022-03-01T20:08:28.148" v="1381" actId="20577"/>
+          <ac:graphicFrameMkLst>
+            <pc:docMk/>
+            <pc:sldMk cId="2011582212" sldId="630"/>
+            <ac:graphicFrameMk id="4" creationId="{00000000-0000-0000-0000-000000000000}"/>
+          </ac:graphicFrameMkLst>
+        </pc:graphicFrameChg>
+      </pc:sldChg>
+    </pc:docChg>
+  </pc:docChgLst>
+  <pc:docChgLst>
     <pc:chgData name="Gerth Stølting Brodal" userId="04ef4784-6591-4f86-a140-f5c3b108582a" providerId="ADAL" clId="{C6AD0761-B891-423A-81A4-2F456D07CD51}"/>
     <pc:docChg chg="modSld">
       <pc:chgData name="Gerth Stølting Brodal" userId="04ef4784-6591-4f86-a140-f5c3b108582a" providerId="ADAL" clId="{C6AD0761-B891-423A-81A4-2F456D07CD51}" dt="2021-03-02T11:34:10.900" v="41" actId="20577"/>
@@ -169,18 +324,48 @@
     </pc:docChg>
   </pc:docChgLst>
   <pc:docChgLst>
-    <pc:chgData name="Gerth Stølting" userId="04ef4784-6591-4f86-a140-f5c3b108582a" providerId="ADAL" clId="{734C3A8B-8F67-4AB6-A6C8-CFD1AC566D4B}"/>
-    <pc:docChg chg="modSld sldOrd">
-      <pc:chgData name="Gerth Stølting" userId="04ef4784-6591-4f86-a140-f5c3b108582a" providerId="ADAL" clId="{734C3A8B-8F67-4AB6-A6C8-CFD1AC566D4B}" dt="2023-03-06T07:56:07.490" v="3"/>
+    <pc:chgData name="Gerth Stølting Brodal" userId="04ef4784-6591-4f86-a140-f5c3b108582a" providerId="ADAL" clId="{70B00F23-41E4-4EAF-AB10-65CD07002C7D}"/>
+    <pc:docChg chg="custSel modSld">
+      <pc:chgData name="Gerth Stølting Brodal" userId="04ef4784-6591-4f86-a140-f5c3b108582a" providerId="ADAL" clId="{70B00F23-41E4-4EAF-AB10-65CD07002C7D}" dt="2024-02-28T06:20:02.748" v="19" actId="313"/>
       <pc:docMkLst>
         <pc:docMk/>
       </pc:docMkLst>
-      <pc:sldChg chg="ord">
-        <pc:chgData name="Gerth Stølting" userId="04ef4784-6591-4f86-a140-f5c3b108582a" providerId="ADAL" clId="{734C3A8B-8F67-4AB6-A6C8-CFD1AC566D4B}" dt="2023-03-06T07:56:07.490" v="3"/>
+      <pc:sldChg chg="modNotesTx">
+        <pc:chgData name="Gerth Stølting Brodal" userId="04ef4784-6591-4f86-a140-f5c3b108582a" providerId="ADAL" clId="{70B00F23-41E4-4EAF-AB10-65CD07002C7D}" dt="2024-02-28T06:17:45.484" v="1" actId="20577"/>
         <pc:sldMkLst>
           <pc:docMk/>
-          <pc:sldMk cId="801879974" sldId="510"/>
+          <pc:sldMk cId="2185570808" sldId="618"/>
         </pc:sldMkLst>
+      </pc:sldChg>
+      <pc:sldChg chg="modSp mod">
+        <pc:chgData name="Gerth Stølting Brodal" userId="04ef4784-6591-4f86-a140-f5c3b108582a" providerId="ADAL" clId="{70B00F23-41E4-4EAF-AB10-65CD07002C7D}" dt="2024-02-28T06:20:02.748" v="19" actId="313"/>
+        <pc:sldMkLst>
+          <pc:docMk/>
+          <pc:sldMk cId="2566093429" sldId="619"/>
+        </pc:sldMkLst>
+        <pc:graphicFrameChg chg="modGraphic">
+          <ac:chgData name="Gerth Stølting Brodal" userId="04ef4784-6591-4f86-a140-f5c3b108582a" providerId="ADAL" clId="{70B00F23-41E4-4EAF-AB10-65CD07002C7D}" dt="2024-02-28T06:20:02.748" v="19" actId="313"/>
+          <ac:graphicFrameMkLst>
+            <pc:docMk/>
+            <pc:sldMk cId="2566093429" sldId="619"/>
+            <ac:graphicFrameMk id="4" creationId="{00000000-0000-0000-0000-000000000000}"/>
+          </ac:graphicFrameMkLst>
+        </pc:graphicFrameChg>
+      </pc:sldChg>
+      <pc:sldChg chg="modSp mod">
+        <pc:chgData name="Gerth Stølting Brodal" userId="04ef4784-6591-4f86-a140-f5c3b108582a" providerId="ADAL" clId="{70B00F23-41E4-4EAF-AB10-65CD07002C7D}" dt="2024-02-28T06:19:55.486" v="9" actId="313"/>
+        <pc:sldMkLst>
+          <pc:docMk/>
+          <pc:sldMk cId="1879065634" sldId="620"/>
+        </pc:sldMkLst>
+        <pc:graphicFrameChg chg="modGraphic">
+          <ac:chgData name="Gerth Stølting Brodal" userId="04ef4784-6591-4f86-a140-f5c3b108582a" providerId="ADAL" clId="{70B00F23-41E4-4EAF-AB10-65CD07002C7D}" dt="2024-02-28T06:19:55.486" v="9" actId="313"/>
+          <ac:graphicFrameMkLst>
+            <pc:docMk/>
+            <pc:sldMk cId="1879065634" sldId="620"/>
+            <ac:graphicFrameMk id="4" creationId="{00000000-0000-0000-0000-000000000000}"/>
+          </ac:graphicFrameMkLst>
+        </pc:graphicFrameChg>
       </pc:sldChg>
     </pc:docChg>
   </pc:docChgLst>
@@ -349,175 +534,6 @@
       </pc:sldChg>
     </pc:docChg>
   </pc:docChgLst>
-  <pc:docChgLst>
-    <pc:chgData name="Gerth Stølting Brodal" userId="04ef4784-6591-4f86-a140-f5c3b108582a" providerId="ADAL" clId="{93408A75-2116-4BC9-8B13-FD5E23B56413}"/>
-    <pc:docChg chg="undo custSel addSld delSld modSld">
-      <pc:chgData name="Gerth Stølting Brodal" userId="04ef4784-6591-4f86-a140-f5c3b108582a" providerId="ADAL" clId="{93408A75-2116-4BC9-8B13-FD5E23B56413}" dt="2022-03-02T12:39:09.586" v="1511" actId="20577"/>
-      <pc:docMkLst>
-        <pc:docMk/>
-      </pc:docMkLst>
-      <pc:sldChg chg="modSp mod">
-        <pc:chgData name="Gerth Stølting Brodal" userId="04ef4784-6591-4f86-a140-f5c3b108582a" providerId="ADAL" clId="{93408A75-2116-4BC9-8B13-FD5E23B56413}" dt="2022-03-02T12:21:43.829" v="1493" actId="20577"/>
-        <pc:sldMkLst>
-          <pc:docMk/>
-          <pc:sldMk cId="2401375598" sldId="616"/>
-        </pc:sldMkLst>
-        <pc:spChg chg="mod">
-          <ac:chgData name="Gerth Stølting Brodal" userId="04ef4784-6591-4f86-a140-f5c3b108582a" providerId="ADAL" clId="{93408A75-2116-4BC9-8B13-FD5E23B56413}" dt="2022-03-02T12:21:43.829" v="1493" actId="20577"/>
-          <ac:spMkLst>
-            <pc:docMk/>
-            <pc:sldMk cId="2401375598" sldId="616"/>
-            <ac:spMk id="3" creationId="{00000000-0000-0000-0000-000000000000}"/>
-          </ac:spMkLst>
-        </pc:spChg>
-      </pc:sldChg>
-      <pc:sldChg chg="modNotesTx">
-        <pc:chgData name="Gerth Stølting Brodal" userId="04ef4784-6591-4f86-a140-f5c3b108582a" providerId="ADAL" clId="{93408A75-2116-4BC9-8B13-FD5E23B56413}" dt="2022-03-01T20:13:10.896" v="1485" actId="20577"/>
-        <pc:sldMkLst>
-          <pc:docMk/>
-          <pc:sldMk cId="2117179183" sldId="626"/>
-        </pc:sldMkLst>
-      </pc:sldChg>
-      <pc:sldChg chg="del">
-        <pc:chgData name="Gerth Stølting Brodal" userId="04ef4784-6591-4f86-a140-f5c3b108582a" providerId="ADAL" clId="{93408A75-2116-4BC9-8B13-FD5E23B56413}" dt="2022-02-22T20:11:02.761" v="59" actId="47"/>
-        <pc:sldMkLst>
-          <pc:docMk/>
-          <pc:sldMk cId="649010544" sldId="627"/>
-        </pc:sldMkLst>
-      </pc:sldChg>
-      <pc:sldChg chg="addSp delSp modSp mod">
-        <pc:chgData name="Gerth Stølting Brodal" userId="04ef4784-6591-4f86-a140-f5c3b108582a" providerId="ADAL" clId="{93408A75-2116-4BC9-8B13-FD5E23B56413}" dt="2022-03-02T12:39:09.586" v="1511" actId="20577"/>
-        <pc:sldMkLst>
-          <pc:docMk/>
-          <pc:sldMk cId="256353597" sldId="628"/>
-        </pc:sldMkLst>
-        <pc:spChg chg="mod">
-          <ac:chgData name="Gerth Stølting Brodal" userId="04ef4784-6591-4f86-a140-f5c3b108582a" providerId="ADAL" clId="{93408A75-2116-4BC9-8B13-FD5E23B56413}" dt="2022-03-02T12:38:40.366" v="1499" actId="1076"/>
-          <ac:spMkLst>
-            <pc:docMk/>
-            <pc:sldMk cId="256353597" sldId="628"/>
-            <ac:spMk id="2" creationId="{00000000-0000-0000-0000-000000000000}"/>
-          </ac:spMkLst>
-        </pc:spChg>
-        <pc:spChg chg="add del">
-          <ac:chgData name="Gerth Stølting Brodal" userId="04ef4784-6591-4f86-a140-f5c3b108582a" providerId="ADAL" clId="{93408A75-2116-4BC9-8B13-FD5E23B56413}" dt="2022-03-02T12:38:30.715" v="1495"/>
-          <ac:spMkLst>
-            <pc:docMk/>
-            <pc:sldMk cId="256353597" sldId="628"/>
-            <ac:spMk id="3" creationId="{E7B59981-4DAC-4311-B3B1-F66DA93A35AC}"/>
-          </ac:spMkLst>
-        </pc:spChg>
-        <pc:spChg chg="add mod">
-          <ac:chgData name="Gerth Stølting Brodal" userId="04ef4784-6591-4f86-a140-f5c3b108582a" providerId="ADAL" clId="{93408A75-2116-4BC9-8B13-FD5E23B56413}" dt="2022-03-02T12:39:09.586" v="1511" actId="20577"/>
-          <ac:spMkLst>
-            <pc:docMk/>
-            <pc:sldMk cId="256353597" sldId="628"/>
-            <ac:spMk id="5" creationId="{992BE75F-A1CA-4720-829E-E6D5124EB17C}"/>
-          </ac:spMkLst>
-        </pc:spChg>
-        <pc:graphicFrameChg chg="mod">
-          <ac:chgData name="Gerth Stølting Brodal" userId="04ef4784-6591-4f86-a140-f5c3b108582a" providerId="ADAL" clId="{93408A75-2116-4BC9-8B13-FD5E23B56413}" dt="2022-03-02T12:38:33.659" v="1496"/>
-          <ac:graphicFrameMkLst>
-            <pc:docMk/>
-            <pc:sldMk cId="256353597" sldId="628"/>
-            <ac:graphicFrameMk id="4" creationId="{00000000-0000-0000-0000-000000000000}"/>
-          </ac:graphicFrameMkLst>
-        </pc:graphicFrameChg>
-      </pc:sldChg>
-      <pc:sldChg chg="modNotesTx">
-        <pc:chgData name="Gerth Stølting Brodal" userId="04ef4784-6591-4f86-a140-f5c3b108582a" providerId="ADAL" clId="{93408A75-2116-4BC9-8B13-FD5E23B56413}" dt="2022-02-22T20:09:56.624" v="58" actId="20577"/>
-        <pc:sldMkLst>
-          <pc:docMk/>
-          <pc:sldMk cId="110934910" sldId="629"/>
-        </pc:sldMkLst>
-      </pc:sldChg>
-      <pc:sldChg chg="modSp add mod modNotesTx">
-        <pc:chgData name="Gerth Stølting Brodal" userId="04ef4784-6591-4f86-a140-f5c3b108582a" providerId="ADAL" clId="{93408A75-2116-4BC9-8B13-FD5E23B56413}" dt="2022-03-01T20:08:28.148" v="1381" actId="20577"/>
-        <pc:sldMkLst>
-          <pc:docMk/>
-          <pc:sldMk cId="2011582212" sldId="630"/>
-        </pc:sldMkLst>
-        <pc:spChg chg="mod">
-          <ac:chgData name="Gerth Stølting Brodal" userId="04ef4784-6591-4f86-a140-f5c3b108582a" providerId="ADAL" clId="{93408A75-2116-4BC9-8B13-FD5E23B56413}" dt="2022-02-22T20:58:28.934" v="862" actId="1035"/>
-          <ac:spMkLst>
-            <pc:docMk/>
-            <pc:sldMk cId="2011582212" sldId="630"/>
-            <ac:spMk id="2" creationId="{00000000-0000-0000-0000-000000000000}"/>
-          </ac:spMkLst>
-        </pc:spChg>
-        <pc:spChg chg="mod">
-          <ac:chgData name="Gerth Stølting Brodal" userId="04ef4784-6591-4f86-a140-f5c3b108582a" providerId="ADAL" clId="{93408A75-2116-4BC9-8B13-FD5E23B56413}" dt="2022-02-22T21:11:42.926" v="1378" actId="20577"/>
-          <ac:spMkLst>
-            <pc:docMk/>
-            <pc:sldMk cId="2011582212" sldId="630"/>
-            <ac:spMk id="3" creationId="{00000000-0000-0000-0000-000000000000}"/>
-          </ac:spMkLst>
-        </pc:spChg>
-        <pc:spChg chg="mod">
-          <ac:chgData name="Gerth Stølting Brodal" userId="04ef4784-6591-4f86-a140-f5c3b108582a" providerId="ADAL" clId="{93408A75-2116-4BC9-8B13-FD5E23B56413}" dt="2022-02-22T20:49:42.922" v="594" actId="20577"/>
-          <ac:spMkLst>
-            <pc:docMk/>
-            <pc:sldMk cId="2011582212" sldId="630"/>
-            <ac:spMk id="5" creationId="{00000000-0000-0000-0000-000000000000}"/>
-          </ac:spMkLst>
-        </pc:spChg>
-        <pc:graphicFrameChg chg="mod modGraphic">
-          <ac:chgData name="Gerth Stølting Brodal" userId="04ef4784-6591-4f86-a140-f5c3b108582a" providerId="ADAL" clId="{93408A75-2116-4BC9-8B13-FD5E23B56413}" dt="2022-03-01T20:08:28.148" v="1381" actId="20577"/>
-          <ac:graphicFrameMkLst>
-            <pc:docMk/>
-            <pc:sldMk cId="2011582212" sldId="630"/>
-            <ac:graphicFrameMk id="4" creationId="{00000000-0000-0000-0000-000000000000}"/>
-          </ac:graphicFrameMkLst>
-        </pc:graphicFrameChg>
-      </pc:sldChg>
-    </pc:docChg>
-  </pc:docChgLst>
-  <pc:docChgLst>
-    <pc:chgData name="Gerth Stølting Brodal" userId="04ef4784-6591-4f86-a140-f5c3b108582a" providerId="ADAL" clId="{70B00F23-41E4-4EAF-AB10-65CD07002C7D}"/>
-    <pc:docChg chg="custSel modSld">
-      <pc:chgData name="Gerth Stølting Brodal" userId="04ef4784-6591-4f86-a140-f5c3b108582a" providerId="ADAL" clId="{70B00F23-41E4-4EAF-AB10-65CD07002C7D}" dt="2024-02-28T06:20:02.748" v="19" actId="313"/>
-      <pc:docMkLst>
-        <pc:docMk/>
-      </pc:docMkLst>
-      <pc:sldChg chg="modNotesTx">
-        <pc:chgData name="Gerth Stølting Brodal" userId="04ef4784-6591-4f86-a140-f5c3b108582a" providerId="ADAL" clId="{70B00F23-41E4-4EAF-AB10-65CD07002C7D}" dt="2024-02-28T06:17:45.484" v="1" actId="20577"/>
-        <pc:sldMkLst>
-          <pc:docMk/>
-          <pc:sldMk cId="2185570808" sldId="618"/>
-        </pc:sldMkLst>
-      </pc:sldChg>
-      <pc:sldChg chg="modSp mod">
-        <pc:chgData name="Gerth Stølting Brodal" userId="04ef4784-6591-4f86-a140-f5c3b108582a" providerId="ADAL" clId="{70B00F23-41E4-4EAF-AB10-65CD07002C7D}" dt="2024-02-28T06:20:02.748" v="19" actId="313"/>
-        <pc:sldMkLst>
-          <pc:docMk/>
-          <pc:sldMk cId="2566093429" sldId="619"/>
-        </pc:sldMkLst>
-        <pc:graphicFrameChg chg="modGraphic">
-          <ac:chgData name="Gerth Stølting Brodal" userId="04ef4784-6591-4f86-a140-f5c3b108582a" providerId="ADAL" clId="{70B00F23-41E4-4EAF-AB10-65CD07002C7D}" dt="2024-02-28T06:20:02.748" v="19" actId="313"/>
-          <ac:graphicFrameMkLst>
-            <pc:docMk/>
-            <pc:sldMk cId="2566093429" sldId="619"/>
-            <ac:graphicFrameMk id="4" creationId="{00000000-0000-0000-0000-000000000000}"/>
-          </ac:graphicFrameMkLst>
-        </pc:graphicFrameChg>
-      </pc:sldChg>
-      <pc:sldChg chg="modSp mod">
-        <pc:chgData name="Gerth Stølting Brodal" userId="04ef4784-6591-4f86-a140-f5c3b108582a" providerId="ADAL" clId="{70B00F23-41E4-4EAF-AB10-65CD07002C7D}" dt="2024-02-28T06:19:55.486" v="9" actId="313"/>
-        <pc:sldMkLst>
-          <pc:docMk/>
-          <pc:sldMk cId="1879065634" sldId="620"/>
-        </pc:sldMkLst>
-        <pc:graphicFrameChg chg="modGraphic">
-          <ac:chgData name="Gerth Stølting Brodal" userId="04ef4784-6591-4f86-a140-f5c3b108582a" providerId="ADAL" clId="{70B00F23-41E4-4EAF-AB10-65CD07002C7D}" dt="2024-02-28T06:19:55.486" v="9" actId="313"/>
-          <ac:graphicFrameMkLst>
-            <pc:docMk/>
-            <pc:sldMk cId="1879065634" sldId="620"/>
-            <ac:graphicFrameMk id="4" creationId="{00000000-0000-0000-0000-000000000000}"/>
-          </ac:graphicFrameMkLst>
-        </pc:graphicFrameChg>
-      </pc:sldChg>
-    </pc:docChg>
-  </pc:docChgLst>
 </pc:chgInfo>
 </file>
 
@@ -603,7 +619,7 @@
           <a:p>
             <a:fld id="{FB1A172F-81D4-4DC4-9113-1DBD56EC3646}" type="datetimeFigureOut">
               <a:rPr lang="en-US" smtClean="0"/>
-              <a:t>2/28/2024</a:t>
+              <a:t>10/27/2024</a:t>
             </a:fld>
             <a:endParaRPr lang="en-US"/>
           </a:p>
@@ -1419,11 +1435,33 @@
           <a:p>
             <a:r>
               <a:rPr lang="en-US" dirty="0"/>
-              <a:t>Dotted edges show the namespace of a function</a:t>
-            </a:r>
-            <a:r>
-              <a:rPr lang="en-US"/>
-              <a:t>/lambda</a:t>
+              <a:t>Dotted edges show the namespace of a function/lambda</a:t>
+            </a:r>
+          </a:p>
+          <a:p>
+            <a:r>
+              <a:rPr lang="en-US" dirty="0"/>
+              <a:t>The namespaces containing “a” and “b” exist </a:t>
+            </a:r>
+            <a:r>
+              <a:rPr lang="en-US" i="1" dirty="0"/>
+              <a:t>after</a:t>
+            </a:r>
+            <a:r>
+              <a:rPr lang="en-US" i="0" dirty="0"/>
+              <a:t> f </a:t>
+            </a:r>
+            <a:r>
+              <a:rPr lang="en-US" i="0" dirty="0" err="1"/>
+              <a:t>gand</a:t>
+            </a:r>
+            <a:r>
+              <a:rPr lang="en-US" i="0" dirty="0"/>
+              <a:t> g have been constructed., since lambda exist in </a:t>
+            </a:r>
+            <a:r>
+              <a:rPr lang="en-US" i="0"/>
+              <a:t>context where these were defined</a:t>
             </a:r>
             <a:endParaRPr lang="da-DK" dirty="0"/>
           </a:p>
@@ -2551,7 +2589,7 @@
           <a:p>
             <a:fld id="{0560A9CD-0304-4E0B-9E82-E7E0115DE05B}" type="datetimeFigureOut">
               <a:rPr lang="en-US" smtClean="0"/>
-              <a:t>2/28/2024</a:t>
+              <a:t>10/27/2024</a:t>
             </a:fld>
             <a:endParaRPr lang="en-US"/>
           </a:p>
@@ -2719,7 +2757,7 @@
           <a:p>
             <a:fld id="{0560A9CD-0304-4E0B-9E82-E7E0115DE05B}" type="datetimeFigureOut">
               <a:rPr lang="en-US" smtClean="0"/>
-              <a:t>2/28/2024</a:t>
+              <a:t>10/27/2024</a:t>
             </a:fld>
             <a:endParaRPr lang="en-US"/>
           </a:p>
@@ -2897,7 +2935,7 @@
           <a:p>
             <a:fld id="{0560A9CD-0304-4E0B-9E82-E7E0115DE05B}" type="datetimeFigureOut">
               <a:rPr lang="en-US" smtClean="0"/>
-              <a:t>2/28/2024</a:t>
+              <a:t>10/27/2024</a:t>
             </a:fld>
             <a:endParaRPr lang="en-US"/>
           </a:p>
@@ -3080,7 +3118,7 @@
           <a:p>
             <a:fld id="{0560A9CD-0304-4E0B-9E82-E7E0115DE05B}" type="datetimeFigureOut">
               <a:rPr lang="en-US" smtClean="0"/>
-              <a:t>2/28/2024</a:t>
+              <a:t>10/27/2024</a:t>
             </a:fld>
             <a:endParaRPr lang="en-US"/>
           </a:p>
@@ -3325,7 +3363,7 @@
           <a:p>
             <a:fld id="{0560A9CD-0304-4E0B-9E82-E7E0115DE05B}" type="datetimeFigureOut">
               <a:rPr lang="en-US" smtClean="0"/>
-              <a:t>2/28/2024</a:t>
+              <a:t>10/27/2024</a:t>
             </a:fld>
             <a:endParaRPr lang="en-US"/>
           </a:p>
@@ -3554,7 +3592,7 @@
           <a:p>
             <a:fld id="{0560A9CD-0304-4E0B-9E82-E7E0115DE05B}" type="datetimeFigureOut">
               <a:rPr lang="en-US" smtClean="0"/>
-              <a:t>2/28/2024</a:t>
+              <a:t>10/27/2024</a:t>
             </a:fld>
             <a:endParaRPr lang="en-US"/>
           </a:p>
@@ -3918,7 +3956,7 @@
           <a:p>
             <a:fld id="{0560A9CD-0304-4E0B-9E82-E7E0115DE05B}" type="datetimeFigureOut">
               <a:rPr lang="en-US" smtClean="0"/>
-              <a:t>2/28/2024</a:t>
+              <a:t>10/27/2024</a:t>
             </a:fld>
             <a:endParaRPr lang="en-US"/>
           </a:p>
@@ -4035,7 +4073,7 @@
           <a:p>
             <a:fld id="{0560A9CD-0304-4E0B-9E82-E7E0115DE05B}" type="datetimeFigureOut">
               <a:rPr lang="en-US" smtClean="0"/>
-              <a:t>2/28/2024</a:t>
+              <a:t>10/27/2024</a:t>
             </a:fld>
             <a:endParaRPr lang="en-US"/>
           </a:p>
@@ -4130,7 +4168,7 @@
           <a:p>
             <a:fld id="{0560A9CD-0304-4E0B-9E82-E7E0115DE05B}" type="datetimeFigureOut">
               <a:rPr lang="en-US" smtClean="0"/>
-              <a:t>2/28/2024</a:t>
+              <a:t>10/27/2024</a:t>
             </a:fld>
             <a:endParaRPr lang="en-US"/>
           </a:p>
@@ -4405,7 +4443,7 @@
           <a:p>
             <a:fld id="{0560A9CD-0304-4E0B-9E82-E7E0115DE05B}" type="datetimeFigureOut">
               <a:rPr lang="en-US" smtClean="0"/>
-              <a:t>2/28/2024</a:t>
+              <a:t>10/27/2024</a:t>
             </a:fld>
             <a:endParaRPr lang="en-US"/>
           </a:p>
@@ -4657,7 +4695,7 @@
           <a:p>
             <a:fld id="{0560A9CD-0304-4E0B-9E82-E7E0115DE05B}" type="datetimeFigureOut">
               <a:rPr lang="en-US" smtClean="0"/>
-              <a:t>2/28/2024</a:t>
+              <a:t>10/27/2024</a:t>
             </a:fld>
             <a:endParaRPr lang="en-US"/>
           </a:p>
@@ -4868,7 +4906,7 @@
           <a:p>
             <a:fld id="{0560A9CD-0304-4E0B-9E82-E7E0115DE05B}" type="datetimeFigureOut">
               <a:rPr lang="en-US" smtClean="0"/>
-              <a:t>2/28/2024</a:t>
+              <a:t>10/27/2024</a:t>
             </a:fld>
             <a:endParaRPr lang="en-US"/>
           </a:p>

</xml_diff>

<commit_message>
all-slides.pdf introduction.pdf introduction.pptx lambda.pdf lambda.pptx
</commit_message>
<xml_diff>
--- a/ipsa/slides/lambda.pptx
+++ b/ipsa/slides/lambda.pptx
@@ -155,11 +155,26 @@
   </pc:docChgLst>
   <pc:docChgLst>
     <pc:chgData name="Gerth Stølting Brodal" userId="04ef4784-6591-4f86-a140-f5c3b108582a" providerId="ADAL" clId="{D95B4D7F-02F6-463D-98C8-C6F480714164}"/>
-    <pc:docChg chg="custSel modSld">
-      <pc:chgData name="Gerth Stølting Brodal" userId="04ef4784-6591-4f86-a140-f5c3b108582a" providerId="ADAL" clId="{D95B4D7F-02F6-463D-98C8-C6F480714164}" dt="2024-10-27T08:04:50.916" v="162" actId="20577"/>
+    <pc:docChg chg="undo custSel modSld">
+      <pc:chgData name="Gerth Stølting Brodal" userId="04ef4784-6591-4f86-a140-f5c3b108582a" providerId="ADAL" clId="{D95B4D7F-02F6-463D-98C8-C6F480714164}" dt="2024-10-27T20:52:30.846" v="466" actId="20577"/>
       <pc:docMkLst>
         <pc:docMk/>
       </pc:docMkLst>
+      <pc:sldChg chg="modSp mod">
+        <pc:chgData name="Gerth Stølting Brodal" userId="04ef4784-6591-4f86-a140-f5c3b108582a" providerId="ADAL" clId="{D95B4D7F-02F6-463D-98C8-C6F480714164}" dt="2024-10-27T20:52:30.846" v="466" actId="20577"/>
+        <pc:sldMkLst>
+          <pc:docMk/>
+          <pc:sldMk cId="801879974" sldId="510"/>
+        </pc:sldMkLst>
+        <pc:spChg chg="mod">
+          <ac:chgData name="Gerth Stølting Brodal" userId="04ef4784-6591-4f86-a140-f5c3b108582a" providerId="ADAL" clId="{D95B4D7F-02F6-463D-98C8-C6F480714164}" dt="2024-10-27T20:52:30.846" v="466" actId="20577"/>
+          <ac:spMkLst>
+            <pc:docMk/>
+            <pc:sldMk cId="801879974" sldId="510"/>
+            <ac:spMk id="3" creationId="{00000000-0000-0000-0000-000000000000}"/>
+          </ac:spMkLst>
+        </pc:spChg>
+      </pc:sldChg>
       <pc:sldChg chg="modNotesTx">
         <pc:chgData name="Gerth Stølting Brodal" userId="04ef4784-6591-4f86-a140-f5c3b108582a" providerId="ADAL" clId="{D95B4D7F-02F6-463D-98C8-C6F480714164}" dt="2024-10-27T08:04:50.916" v="162" actId="20577"/>
         <pc:sldMkLst>
@@ -9058,7 +9073,7 @@
         </p:nvSpPr>
         <p:spPr>
           <a:xfrm>
-            <a:off x="838200" y="1825624"/>
+            <a:off x="838200" y="1801560"/>
             <a:ext cx="10515600" cy="4895809"/>
           </a:xfrm>
         </p:spPr>
@@ -9068,68 +9083,105 @@
           </a:bodyPr>
           <a:lstStyle/>
           <a:p>
+            <a:pPr>
+              <a:spcAft>
+                <a:spcPts val="1200"/>
+              </a:spcAft>
+            </a:pPr>
             <a:r>
               <a:rPr lang="pt-BR" dirty="0"/>
-              <a:t>lambda calculus invented by Alonzo Church in 1930s</a:t>
+              <a:t>Lambda calculus invented by Alonzo Church in 1930s</a:t>
             </a:r>
           </a:p>
           <a:p>
+            <a:pPr>
+              <a:spcAft>
+                <a:spcPts val="1200"/>
+              </a:spcAft>
+            </a:pPr>
+            <a:r>
+              <a:rPr lang="en-US" dirty="0"/>
+              <a:t>At the heart of functional programming languages</a:t>
+            </a:r>
+          </a:p>
+          <a:p>
+            <a:pPr lvl="1">
+              <a:spcAft>
+                <a:spcPts val="1200"/>
+              </a:spcAft>
+            </a:pPr>
+            <a:r>
+              <a:rPr lang="en-US" dirty="0"/>
+              <a:t>LISP (1958)</a:t>
+            </a:r>
+          </a:p>
+          <a:p>
+            <a:pPr lvl="1">
+              <a:spcAft>
+                <a:spcPts val="1200"/>
+              </a:spcAft>
+            </a:pPr>
+            <a:r>
+              <a:rPr lang="en-US" dirty="0"/>
+              <a:t>ML (1973) and its derivatives, e.g. </a:t>
+            </a:r>
+            <a:r>
+              <a:rPr lang="en-US" dirty="0" err="1"/>
+              <a:t>OCaml</a:t>
+            </a:r>
+            <a:r>
+              <a:rPr lang="en-US" dirty="0"/>
+              <a:t> (1996) and F* (2011)</a:t>
+            </a:r>
+          </a:p>
+          <a:p>
+            <a:pPr lvl="1">
+              <a:spcAft>
+                <a:spcPts val="1200"/>
+              </a:spcAft>
+            </a:pPr>
+            <a:r>
+              <a:rPr lang="en-US" dirty="0"/>
+              <a:t>Haskell (1990), based on Miranda (1985)</a:t>
+            </a:r>
             <a:endParaRPr lang="pt-BR" dirty="0"/>
           </a:p>
           <a:p>
-            <a:r>
-              <a:rPr lang="da-DK" dirty="0"/>
-              <a:t>Lisp has had </a:t>
-            </a:r>
-            <a:r>
-              <a:rPr lang="da-DK" dirty="0" err="1"/>
-              <a:t>lambdas</a:t>
-            </a:r>
-            <a:r>
-              <a:rPr lang="da-DK" dirty="0"/>
-              <a:t> </a:t>
-            </a:r>
-            <a:r>
-              <a:rPr lang="da-DK" dirty="0" err="1"/>
-              <a:t>since</a:t>
-            </a:r>
-            <a:r>
-              <a:rPr lang="da-DK" dirty="0"/>
-              <a:t> 1958</a:t>
-            </a:r>
-            <a:endParaRPr lang="en-US" dirty="0"/>
+            <a:pPr>
+              <a:spcAft>
+                <a:spcPts val="1200"/>
+              </a:spcAft>
+            </a:pPr>
+            <a:r>
+              <a:rPr lang="pt-BR" dirty="0"/>
+              <a:t>C++ got lambdas with C++11 in 2011 (26 years after 1st release)</a:t>
+            </a:r>
           </a:p>
           <a:p>
-            <a:endParaRPr lang="pt-BR" dirty="0"/>
+            <a:pPr>
+              <a:spcAft>
+                <a:spcPts val="1200"/>
+              </a:spcAft>
+            </a:pPr>
+            <a:r>
+              <a:rPr lang="pt-BR" dirty="0"/>
+              <a:t>Java first got lambdas with Java 8 in 2014 (19 years after 1st release)</a:t>
+            </a:r>
           </a:p>
           <a:p>
+            <a:pPr>
+              <a:spcAft>
+                <a:spcPts val="1200"/>
+              </a:spcAft>
+            </a:pPr>
             <a:r>
               <a:rPr lang="pt-BR" dirty="0"/>
-              <a:t>C++ got lambdas in C++11 in 2011</a:t>
-            </a:r>
-          </a:p>
-          <a:p>
-            <a:endParaRPr lang="pt-BR" dirty="0"/>
-          </a:p>
-          <a:p>
-            <a:r>
-              <a:rPr lang="pt-BR" dirty="0"/>
-              <a:t>Java first got lambdas in Java 8 in 2014</a:t>
-            </a:r>
-          </a:p>
-          <a:p>
-            <a:endParaRPr lang="pt-BR" dirty="0"/>
-          </a:p>
-          <a:p>
-            <a:r>
-              <a:rPr lang="pt-BR" dirty="0"/>
-              <a:t>Python has had lambdas since Version 1.0 in 1994</a:t>
-            </a:r>
-          </a:p>
-          <a:p>
-            <a:endParaRPr lang="pt-BR" dirty="0"/>
-          </a:p>
-          <a:p>
+              <a:t>Python has had lambdas since its </a:t>
+            </a:r>
+            <a:r>
+              <a:rPr lang="pt-BR"/>
+              <a:t>inception in 1994</a:t>
+            </a:r>
             <a:endParaRPr lang="da-DK" dirty="0"/>
           </a:p>
         </p:txBody>

</xml_diff>

<commit_message>
exercises.html all-slides.pdf lambda.pdf lambda.pptx
</commit_message>
<xml_diff>
--- a/ipsa/slides/lambda.pptx
+++ b/ipsa/slides/lambda.pptx
@@ -166,14 +166,6 @@
           <pc:docMk/>
           <pc:sldMk cId="801879974" sldId="510"/>
         </pc:sldMkLst>
-        <pc:spChg chg="mod">
-          <ac:chgData name="Gerth Stølting Brodal" userId="04ef4784-6591-4f86-a140-f5c3b108582a" providerId="ADAL" clId="{D95B4D7F-02F6-463D-98C8-C6F480714164}" dt="2024-10-27T20:52:30.846" v="466" actId="20577"/>
-          <ac:spMkLst>
-            <pc:docMk/>
-            <pc:sldMk cId="801879974" sldId="510"/>
-            <ac:spMk id="3" creationId="{00000000-0000-0000-0000-000000000000}"/>
-          </ac:spMkLst>
-        </pc:spChg>
       </pc:sldChg>
       <pc:sldChg chg="modNotesTx">
         <pc:chgData name="Gerth Stølting Brodal" userId="04ef4784-6591-4f86-a140-f5c3b108582a" providerId="ADAL" clId="{D95B4D7F-02F6-463D-98C8-C6F480714164}" dt="2024-10-27T08:04:50.916" v="162" actId="20577"/>
@@ -197,14 +189,6 @@
           <pc:docMk/>
           <pc:sldMk cId="2401375598" sldId="616"/>
         </pc:sldMkLst>
-        <pc:spChg chg="mod">
-          <ac:chgData name="Gerth Stølting Brodal" userId="04ef4784-6591-4f86-a140-f5c3b108582a" providerId="ADAL" clId="{93408A75-2116-4BC9-8B13-FD5E23B56413}" dt="2022-03-02T12:21:43.829" v="1493" actId="20577"/>
-          <ac:spMkLst>
-            <pc:docMk/>
-            <pc:sldMk cId="2401375598" sldId="616"/>
-            <ac:spMk id="3" creationId="{00000000-0000-0000-0000-000000000000}"/>
-          </ac:spMkLst>
-        </pc:spChg>
       </pc:sldChg>
       <pc:sldChg chg="modNotesTx">
         <pc:chgData name="Gerth Stølting Brodal" userId="04ef4784-6591-4f86-a140-f5c3b108582a" providerId="ADAL" clId="{93408A75-2116-4BC9-8B13-FD5E23B56413}" dt="2022-03-01T20:13:10.896" v="1485" actId="20577"/>
@@ -226,38 +210,6 @@
           <pc:docMk/>
           <pc:sldMk cId="256353597" sldId="628"/>
         </pc:sldMkLst>
-        <pc:spChg chg="mod">
-          <ac:chgData name="Gerth Stølting Brodal" userId="04ef4784-6591-4f86-a140-f5c3b108582a" providerId="ADAL" clId="{93408A75-2116-4BC9-8B13-FD5E23B56413}" dt="2022-03-02T12:38:40.366" v="1499" actId="1076"/>
-          <ac:spMkLst>
-            <pc:docMk/>
-            <pc:sldMk cId="256353597" sldId="628"/>
-            <ac:spMk id="2" creationId="{00000000-0000-0000-0000-000000000000}"/>
-          </ac:spMkLst>
-        </pc:spChg>
-        <pc:spChg chg="add del">
-          <ac:chgData name="Gerth Stølting Brodal" userId="04ef4784-6591-4f86-a140-f5c3b108582a" providerId="ADAL" clId="{93408A75-2116-4BC9-8B13-FD5E23B56413}" dt="2022-03-02T12:38:30.715" v="1495"/>
-          <ac:spMkLst>
-            <pc:docMk/>
-            <pc:sldMk cId="256353597" sldId="628"/>
-            <ac:spMk id="3" creationId="{E7B59981-4DAC-4311-B3B1-F66DA93A35AC}"/>
-          </ac:spMkLst>
-        </pc:spChg>
-        <pc:spChg chg="add mod">
-          <ac:chgData name="Gerth Stølting Brodal" userId="04ef4784-6591-4f86-a140-f5c3b108582a" providerId="ADAL" clId="{93408A75-2116-4BC9-8B13-FD5E23B56413}" dt="2022-03-02T12:39:09.586" v="1511" actId="20577"/>
-          <ac:spMkLst>
-            <pc:docMk/>
-            <pc:sldMk cId="256353597" sldId="628"/>
-            <ac:spMk id="5" creationId="{992BE75F-A1CA-4720-829E-E6D5124EB17C}"/>
-          </ac:spMkLst>
-        </pc:spChg>
-        <pc:graphicFrameChg chg="mod">
-          <ac:chgData name="Gerth Stølting Brodal" userId="04ef4784-6591-4f86-a140-f5c3b108582a" providerId="ADAL" clId="{93408A75-2116-4BC9-8B13-FD5E23B56413}" dt="2022-03-02T12:38:33.659" v="1496"/>
-          <ac:graphicFrameMkLst>
-            <pc:docMk/>
-            <pc:sldMk cId="256353597" sldId="628"/>
-            <ac:graphicFrameMk id="4" creationId="{00000000-0000-0000-0000-000000000000}"/>
-          </ac:graphicFrameMkLst>
-        </pc:graphicFrameChg>
       </pc:sldChg>
       <pc:sldChg chg="modNotesTx">
         <pc:chgData name="Gerth Stølting Brodal" userId="04ef4784-6591-4f86-a140-f5c3b108582a" providerId="ADAL" clId="{93408A75-2116-4BC9-8B13-FD5E23B56413}" dt="2022-02-22T20:09:56.624" v="58" actId="20577"/>
@@ -272,38 +224,6 @@
           <pc:docMk/>
           <pc:sldMk cId="2011582212" sldId="630"/>
         </pc:sldMkLst>
-        <pc:spChg chg="mod">
-          <ac:chgData name="Gerth Stølting Brodal" userId="04ef4784-6591-4f86-a140-f5c3b108582a" providerId="ADAL" clId="{93408A75-2116-4BC9-8B13-FD5E23B56413}" dt="2022-02-22T20:58:28.934" v="862" actId="1035"/>
-          <ac:spMkLst>
-            <pc:docMk/>
-            <pc:sldMk cId="2011582212" sldId="630"/>
-            <ac:spMk id="2" creationId="{00000000-0000-0000-0000-000000000000}"/>
-          </ac:spMkLst>
-        </pc:spChg>
-        <pc:spChg chg="mod">
-          <ac:chgData name="Gerth Stølting Brodal" userId="04ef4784-6591-4f86-a140-f5c3b108582a" providerId="ADAL" clId="{93408A75-2116-4BC9-8B13-FD5E23B56413}" dt="2022-02-22T21:11:42.926" v="1378" actId="20577"/>
-          <ac:spMkLst>
-            <pc:docMk/>
-            <pc:sldMk cId="2011582212" sldId="630"/>
-            <ac:spMk id="3" creationId="{00000000-0000-0000-0000-000000000000}"/>
-          </ac:spMkLst>
-        </pc:spChg>
-        <pc:spChg chg="mod">
-          <ac:chgData name="Gerth Stølting Brodal" userId="04ef4784-6591-4f86-a140-f5c3b108582a" providerId="ADAL" clId="{93408A75-2116-4BC9-8B13-FD5E23B56413}" dt="2022-02-22T20:49:42.922" v="594" actId="20577"/>
-          <ac:spMkLst>
-            <pc:docMk/>
-            <pc:sldMk cId="2011582212" sldId="630"/>
-            <ac:spMk id="5" creationId="{00000000-0000-0000-0000-000000000000}"/>
-          </ac:spMkLst>
-        </pc:spChg>
-        <pc:graphicFrameChg chg="mod modGraphic">
-          <ac:chgData name="Gerth Stølting Brodal" userId="04ef4784-6591-4f86-a140-f5c3b108582a" providerId="ADAL" clId="{93408A75-2116-4BC9-8B13-FD5E23B56413}" dt="2022-03-01T20:08:28.148" v="1381" actId="20577"/>
-          <ac:graphicFrameMkLst>
-            <pc:docMk/>
-            <pc:sldMk cId="2011582212" sldId="630"/>
-            <ac:graphicFrameMk id="4" creationId="{00000000-0000-0000-0000-000000000000}"/>
-          </ac:graphicFrameMkLst>
-        </pc:graphicFrameChg>
       </pc:sldChg>
     </pc:docChg>
   </pc:docChgLst>
@@ -320,14 +240,6 @@
           <pc:docMk/>
           <pc:sldMk cId="1492179731" sldId="611"/>
         </pc:sldMkLst>
-        <pc:graphicFrameChg chg="modGraphic">
-          <ac:chgData name="Gerth Stølting Brodal" userId="04ef4784-6591-4f86-a140-f5c3b108582a" providerId="ADAL" clId="{C6AD0761-B891-423A-81A4-2F456D07CD51}" dt="2021-03-02T11:28:45.581" v="4" actId="20577"/>
-          <ac:graphicFrameMkLst>
-            <pc:docMk/>
-            <pc:sldMk cId="1492179731" sldId="611"/>
-            <ac:graphicFrameMk id="4" creationId="{00000000-0000-0000-0000-000000000000}"/>
-          </ac:graphicFrameMkLst>
-        </pc:graphicFrameChg>
       </pc:sldChg>
       <pc:sldChg chg="modNotesTx">
         <pc:chgData name="Gerth Stølting Brodal" userId="04ef4784-6591-4f86-a140-f5c3b108582a" providerId="ADAL" clId="{C6AD0761-B891-423A-81A4-2F456D07CD51}" dt="2021-03-02T11:34:10.900" v="41" actId="20577"/>
@@ -358,14 +270,6 @@
           <pc:docMk/>
           <pc:sldMk cId="2566093429" sldId="619"/>
         </pc:sldMkLst>
-        <pc:graphicFrameChg chg="modGraphic">
-          <ac:chgData name="Gerth Stølting Brodal" userId="04ef4784-6591-4f86-a140-f5c3b108582a" providerId="ADAL" clId="{70B00F23-41E4-4EAF-AB10-65CD07002C7D}" dt="2024-02-28T06:20:02.748" v="19" actId="313"/>
-          <ac:graphicFrameMkLst>
-            <pc:docMk/>
-            <pc:sldMk cId="2566093429" sldId="619"/>
-            <ac:graphicFrameMk id="4" creationId="{00000000-0000-0000-0000-000000000000}"/>
-          </ac:graphicFrameMkLst>
-        </pc:graphicFrameChg>
       </pc:sldChg>
       <pc:sldChg chg="modSp mod">
         <pc:chgData name="Gerth Stølting Brodal" userId="04ef4784-6591-4f86-a140-f5c3b108582a" providerId="ADAL" clId="{70B00F23-41E4-4EAF-AB10-65CD07002C7D}" dt="2024-02-28T06:19:55.486" v="9" actId="313"/>
@@ -373,14 +277,6 @@
           <pc:docMk/>
           <pc:sldMk cId="1879065634" sldId="620"/>
         </pc:sldMkLst>
-        <pc:graphicFrameChg chg="modGraphic">
-          <ac:chgData name="Gerth Stølting Brodal" userId="04ef4784-6591-4f86-a140-f5c3b108582a" providerId="ADAL" clId="{70B00F23-41E4-4EAF-AB10-65CD07002C7D}" dt="2024-02-28T06:19:55.486" v="9" actId="313"/>
-          <ac:graphicFrameMkLst>
-            <pc:docMk/>
-            <pc:sldMk cId="1879065634" sldId="620"/>
-            <ac:graphicFrameMk id="4" creationId="{00000000-0000-0000-0000-000000000000}"/>
-          </ac:graphicFrameMkLst>
-        </pc:graphicFrameChg>
       </pc:sldChg>
     </pc:docChg>
   </pc:docChgLst>
@@ -404,14 +300,6 @@
           <pc:docMk/>
           <pc:sldMk cId="2553496854" sldId="614"/>
         </pc:sldMkLst>
-        <pc:graphicFrameChg chg="modGraphic">
-          <ac:chgData name="Gerth Stølting Brodal" userId="04ef4784-6591-4f86-a140-f5c3b108582a" providerId="ADAL" clId="{734C3A8B-8F67-4AB6-A6C8-CFD1AC566D4B}" dt="2023-02-15T08:10:35.589" v="27" actId="20577"/>
-          <ac:graphicFrameMkLst>
-            <pc:docMk/>
-            <pc:sldMk cId="2553496854" sldId="614"/>
-            <ac:graphicFrameMk id="4" creationId="{00000000-0000-0000-0000-000000000000}"/>
-          </ac:graphicFrameMkLst>
-        </pc:graphicFrameChg>
       </pc:sldChg>
       <pc:sldChg chg="modSp mod">
         <pc:chgData name="Gerth Stølting Brodal" userId="04ef4784-6591-4f86-a140-f5c3b108582a" providerId="ADAL" clId="{734C3A8B-8F67-4AB6-A6C8-CFD1AC566D4B}" dt="2023-03-01T08:59:27.625" v="50" actId="20577"/>
@@ -419,14 +307,6 @@
           <pc:docMk/>
           <pc:sldMk cId="1968763958" sldId="615"/>
         </pc:sldMkLst>
-        <pc:graphicFrameChg chg="modGraphic">
-          <ac:chgData name="Gerth Stølting Brodal" userId="04ef4784-6591-4f86-a140-f5c3b108582a" providerId="ADAL" clId="{734C3A8B-8F67-4AB6-A6C8-CFD1AC566D4B}" dt="2023-03-01T08:59:27.625" v="50" actId="20577"/>
-          <ac:graphicFrameMkLst>
-            <pc:docMk/>
-            <pc:sldMk cId="1968763958" sldId="615"/>
-            <ac:graphicFrameMk id="4" creationId="{00000000-0000-0000-0000-000000000000}"/>
-          </ac:graphicFrameMkLst>
-        </pc:graphicFrameChg>
       </pc:sldChg>
       <pc:sldChg chg="modSp mod modNotesTx">
         <pc:chgData name="Gerth Stølting Brodal" userId="04ef4784-6591-4f86-a140-f5c3b108582a" providerId="ADAL" clId="{734C3A8B-8F67-4AB6-A6C8-CFD1AC566D4B}" dt="2023-03-01T09:10:30.045" v="238" actId="20577"/>
@@ -434,14 +314,6 @@
           <pc:docMk/>
           <pc:sldMk cId="2401375598" sldId="616"/>
         </pc:sldMkLst>
-        <pc:graphicFrameChg chg="modGraphic">
-          <ac:chgData name="Gerth Stølting Brodal" userId="04ef4784-6591-4f86-a140-f5c3b108582a" providerId="ADAL" clId="{734C3A8B-8F67-4AB6-A6C8-CFD1AC566D4B}" dt="2023-03-01T09:08:10.656" v="232" actId="207"/>
-          <ac:graphicFrameMkLst>
-            <pc:docMk/>
-            <pc:sldMk cId="2401375598" sldId="616"/>
-            <ac:graphicFrameMk id="4" creationId="{00000000-0000-0000-0000-000000000000}"/>
-          </ac:graphicFrameMkLst>
-        </pc:graphicFrameChg>
       </pc:sldChg>
       <pc:sldChg chg="modSp mod modNotesTx">
         <pc:chgData name="Gerth Stølting Brodal" userId="04ef4784-6591-4f86-a140-f5c3b108582a" providerId="ADAL" clId="{734C3A8B-8F67-4AB6-A6C8-CFD1AC566D4B}" dt="2023-03-01T09:07:49.743" v="231" actId="20577"/>
@@ -449,14 +321,6 @@
           <pc:docMk/>
           <pc:sldMk cId="1159102347" sldId="617"/>
         </pc:sldMkLst>
-        <pc:spChg chg="mod">
-          <ac:chgData name="Gerth Stølting Brodal" userId="04ef4784-6591-4f86-a140-f5c3b108582a" providerId="ADAL" clId="{734C3A8B-8F67-4AB6-A6C8-CFD1AC566D4B}" dt="2023-03-01T09:06:26.380" v="51" actId="6549"/>
-          <ac:spMkLst>
-            <pc:docMk/>
-            <pc:sldMk cId="1159102347" sldId="617"/>
-            <ac:spMk id="3" creationId="{00000000-0000-0000-0000-000000000000}"/>
-          </ac:spMkLst>
-        </pc:spChg>
       </pc:sldChg>
       <pc:sldChg chg="modSp mod modNotesTx">
         <pc:chgData name="Gerth Stølting Brodal" userId="04ef4784-6591-4f86-a140-f5c3b108582a" providerId="ADAL" clId="{734C3A8B-8F67-4AB6-A6C8-CFD1AC566D4B}" dt="2023-03-01T15:01:13.907" v="446" actId="20577"/>
@@ -464,14 +328,6 @@
           <pc:docMk/>
           <pc:sldMk cId="2185570808" sldId="618"/>
         </pc:sldMkLst>
-        <pc:graphicFrameChg chg="mod modGraphic">
-          <ac:chgData name="Gerth Stølting Brodal" userId="04ef4784-6591-4f86-a140-f5c3b108582a" providerId="ADAL" clId="{734C3A8B-8F67-4AB6-A6C8-CFD1AC566D4B}" dt="2023-03-01T15:01:13.907" v="446" actId="20577"/>
-          <ac:graphicFrameMkLst>
-            <pc:docMk/>
-            <pc:sldMk cId="2185570808" sldId="618"/>
-            <ac:graphicFrameMk id="4" creationId="{00000000-0000-0000-0000-000000000000}"/>
-          </ac:graphicFrameMkLst>
-        </pc:graphicFrameChg>
       </pc:sldChg>
       <pc:sldChg chg="modSp mod">
         <pc:chgData name="Gerth Stølting Brodal" userId="04ef4784-6591-4f86-a140-f5c3b108582a" providerId="ADAL" clId="{734C3A8B-8F67-4AB6-A6C8-CFD1AC566D4B}" dt="2023-03-01T08:55:32.470" v="48" actId="121"/>
@@ -479,14 +335,6 @@
           <pc:docMk/>
           <pc:sldMk cId="2566093429" sldId="619"/>
         </pc:sldMkLst>
-        <pc:graphicFrameChg chg="modGraphic">
-          <ac:chgData name="Gerth Stølting Brodal" userId="04ef4784-6591-4f86-a140-f5c3b108582a" providerId="ADAL" clId="{734C3A8B-8F67-4AB6-A6C8-CFD1AC566D4B}" dt="2023-03-01T08:55:32.470" v="48" actId="121"/>
-          <ac:graphicFrameMkLst>
-            <pc:docMk/>
-            <pc:sldMk cId="2566093429" sldId="619"/>
-            <ac:graphicFrameMk id="4" creationId="{00000000-0000-0000-0000-000000000000}"/>
-          </ac:graphicFrameMkLst>
-        </pc:graphicFrameChg>
       </pc:sldChg>
       <pc:sldChg chg="modSp mod modNotesTx">
         <pc:chgData name="Gerth Stølting Brodal" userId="04ef4784-6591-4f86-a140-f5c3b108582a" providerId="ADAL" clId="{734C3A8B-8F67-4AB6-A6C8-CFD1AC566D4B}" dt="2023-03-01T09:21:47.541" v="316" actId="6549"/>
@@ -494,14 +342,6 @@
           <pc:docMk/>
           <pc:sldMk cId="2156517149" sldId="622"/>
         </pc:sldMkLst>
-        <pc:graphicFrameChg chg="mod modGraphic">
-          <ac:chgData name="Gerth Stølting Brodal" userId="04ef4784-6591-4f86-a140-f5c3b108582a" providerId="ADAL" clId="{734C3A8B-8F67-4AB6-A6C8-CFD1AC566D4B}" dt="2023-03-01T09:21:16.121" v="315" actId="20577"/>
-          <ac:graphicFrameMkLst>
-            <pc:docMk/>
-            <pc:sldMk cId="2156517149" sldId="622"/>
-            <ac:graphicFrameMk id="4" creationId="{00000000-0000-0000-0000-000000000000}"/>
-          </ac:graphicFrameMkLst>
-        </pc:graphicFrameChg>
       </pc:sldChg>
       <pc:sldChg chg="modNotesTx">
         <pc:chgData name="Gerth Stølting Brodal" userId="04ef4784-6591-4f86-a140-f5c3b108582a" providerId="ADAL" clId="{734C3A8B-8F67-4AB6-A6C8-CFD1AC566D4B}" dt="2023-03-05T16:25:58.321" v="519" actId="20577"/>
@@ -516,14 +356,6 @@
           <pc:docMk/>
           <pc:sldMk cId="2117179183" sldId="626"/>
         </pc:sldMkLst>
-        <pc:graphicFrameChg chg="mod modGraphic">
-          <ac:chgData name="Gerth Stølting Brodal" userId="04ef4784-6591-4f86-a140-f5c3b108582a" providerId="ADAL" clId="{734C3A8B-8F67-4AB6-A6C8-CFD1AC566D4B}" dt="2023-03-01T10:17:36.510" v="434" actId="207"/>
-          <ac:graphicFrameMkLst>
-            <pc:docMk/>
-            <pc:sldMk cId="2117179183" sldId="626"/>
-            <ac:graphicFrameMk id="4" creationId="{00000000-0000-0000-0000-000000000000}"/>
-          </ac:graphicFrameMkLst>
-        </pc:graphicFrameChg>
       </pc:sldChg>
       <pc:sldChg chg="modSp mod">
         <pc:chgData name="Gerth Stølting Brodal" userId="04ef4784-6591-4f86-a140-f5c3b108582a" providerId="ADAL" clId="{734C3A8B-8F67-4AB6-A6C8-CFD1AC566D4B}" dt="2023-03-01T10:27:37.070" v="435" actId="20577"/>
@@ -531,14 +363,6 @@
           <pc:docMk/>
           <pc:sldMk cId="256353597" sldId="628"/>
         </pc:sldMkLst>
-        <pc:graphicFrameChg chg="modGraphic">
-          <ac:chgData name="Gerth Stølting Brodal" userId="04ef4784-6591-4f86-a140-f5c3b108582a" providerId="ADAL" clId="{734C3A8B-8F67-4AB6-A6C8-CFD1AC566D4B}" dt="2023-03-01T10:27:37.070" v="435" actId="20577"/>
-          <ac:graphicFrameMkLst>
-            <pc:docMk/>
-            <pc:sldMk cId="256353597" sldId="628"/>
-            <ac:graphicFrameMk id="4" creationId="{00000000-0000-0000-0000-000000000000}"/>
-          </ac:graphicFrameMkLst>
-        </pc:graphicFrameChg>
       </pc:sldChg>
       <pc:sldChg chg="modNotesTx">
         <pc:chgData name="Gerth Stølting Brodal" userId="04ef4784-6591-4f86-a140-f5c3b108582a" providerId="ADAL" clId="{734C3A8B-8F67-4AB6-A6C8-CFD1AC566D4B}" dt="2023-03-01T11:21:10.038" v="437" actId="20577"/>
@@ -634,7 +458,7 @@
           <a:p>
             <a:fld id="{FB1A172F-81D4-4DC4-9113-1DBD56EC3646}" type="datetimeFigureOut">
               <a:rPr lang="en-US" smtClean="0"/>
-              <a:t>10/27/2024</a:t>
+              <a:t>2/25/2025</a:t>
             </a:fld>
             <a:endParaRPr lang="en-US"/>
           </a:p>
@@ -1464,19 +1288,15 @@
             </a:r>
             <a:r>
               <a:rPr lang="en-US" i="0" dirty="0"/>
-              <a:t> f </a:t>
-            </a:r>
-            <a:r>
-              <a:rPr lang="en-US" i="0" dirty="0" err="1"/>
-              <a:t>gand</a:t>
+              <a:t> </a:t>
+            </a:r>
+            <a:r>
+              <a:rPr lang="en-US" i="0"/>
+              <a:t>f and </a:t>
             </a:r>
             <a:r>
               <a:rPr lang="en-US" i="0" dirty="0"/>
-              <a:t> g have been constructed., since lambda exist in </a:t>
-            </a:r>
-            <a:r>
-              <a:rPr lang="en-US" i="0"/>
-              <a:t>context where these were defined</a:t>
+              <a:t>g have been constructed., since lambda exist in context where these were defined</a:t>
             </a:r>
             <a:endParaRPr lang="da-DK" dirty="0"/>
           </a:p>
@@ -2604,7 +2424,7 @@
           <a:p>
             <a:fld id="{0560A9CD-0304-4E0B-9E82-E7E0115DE05B}" type="datetimeFigureOut">
               <a:rPr lang="en-US" smtClean="0"/>
-              <a:t>10/27/2024</a:t>
+              <a:t>2/25/2025</a:t>
             </a:fld>
             <a:endParaRPr lang="en-US"/>
           </a:p>
@@ -2772,7 +2592,7 @@
           <a:p>
             <a:fld id="{0560A9CD-0304-4E0B-9E82-E7E0115DE05B}" type="datetimeFigureOut">
               <a:rPr lang="en-US" smtClean="0"/>
-              <a:t>10/27/2024</a:t>
+              <a:t>2/25/2025</a:t>
             </a:fld>
             <a:endParaRPr lang="en-US"/>
           </a:p>
@@ -2950,7 +2770,7 @@
           <a:p>
             <a:fld id="{0560A9CD-0304-4E0B-9E82-E7E0115DE05B}" type="datetimeFigureOut">
               <a:rPr lang="en-US" smtClean="0"/>
-              <a:t>10/27/2024</a:t>
+              <a:t>2/25/2025</a:t>
             </a:fld>
             <a:endParaRPr lang="en-US"/>
           </a:p>
@@ -3133,7 +2953,7 @@
           <a:p>
             <a:fld id="{0560A9CD-0304-4E0B-9E82-E7E0115DE05B}" type="datetimeFigureOut">
               <a:rPr lang="en-US" smtClean="0"/>
-              <a:t>10/27/2024</a:t>
+              <a:t>2/25/2025</a:t>
             </a:fld>
             <a:endParaRPr lang="en-US"/>
           </a:p>
@@ -3378,7 +3198,7 @@
           <a:p>
             <a:fld id="{0560A9CD-0304-4E0B-9E82-E7E0115DE05B}" type="datetimeFigureOut">
               <a:rPr lang="en-US" smtClean="0"/>
-              <a:t>10/27/2024</a:t>
+              <a:t>2/25/2025</a:t>
             </a:fld>
             <a:endParaRPr lang="en-US"/>
           </a:p>
@@ -3607,7 +3427,7 @@
           <a:p>
             <a:fld id="{0560A9CD-0304-4E0B-9E82-E7E0115DE05B}" type="datetimeFigureOut">
               <a:rPr lang="en-US" smtClean="0"/>
-              <a:t>10/27/2024</a:t>
+              <a:t>2/25/2025</a:t>
             </a:fld>
             <a:endParaRPr lang="en-US"/>
           </a:p>
@@ -3971,7 +3791,7 @@
           <a:p>
             <a:fld id="{0560A9CD-0304-4E0B-9E82-E7E0115DE05B}" type="datetimeFigureOut">
               <a:rPr lang="en-US" smtClean="0"/>
-              <a:t>10/27/2024</a:t>
+              <a:t>2/25/2025</a:t>
             </a:fld>
             <a:endParaRPr lang="en-US"/>
           </a:p>
@@ -4088,7 +3908,7 @@
           <a:p>
             <a:fld id="{0560A9CD-0304-4E0B-9E82-E7E0115DE05B}" type="datetimeFigureOut">
               <a:rPr lang="en-US" smtClean="0"/>
-              <a:t>10/27/2024</a:t>
+              <a:t>2/25/2025</a:t>
             </a:fld>
             <a:endParaRPr lang="en-US"/>
           </a:p>
@@ -4183,7 +4003,7 @@
           <a:p>
             <a:fld id="{0560A9CD-0304-4E0B-9E82-E7E0115DE05B}" type="datetimeFigureOut">
               <a:rPr lang="en-US" smtClean="0"/>
-              <a:t>10/27/2024</a:t>
+              <a:t>2/25/2025</a:t>
             </a:fld>
             <a:endParaRPr lang="en-US"/>
           </a:p>
@@ -4458,7 +4278,7 @@
           <a:p>
             <a:fld id="{0560A9CD-0304-4E0B-9E82-E7E0115DE05B}" type="datetimeFigureOut">
               <a:rPr lang="en-US" smtClean="0"/>
-              <a:t>10/27/2024</a:t>
+              <a:t>2/25/2025</a:t>
             </a:fld>
             <a:endParaRPr lang="en-US"/>
           </a:p>
@@ -4710,7 +4530,7 @@
           <a:p>
             <a:fld id="{0560A9CD-0304-4E0B-9E82-E7E0115DE05B}" type="datetimeFigureOut">
               <a:rPr lang="en-US" smtClean="0"/>
-              <a:t>10/27/2024</a:t>
+              <a:t>2/25/2025</a:t>
             </a:fld>
             <a:endParaRPr lang="en-US"/>
           </a:p>
@@ -4921,7 +4741,7 @@
           <a:p>
             <a:fld id="{0560A9CD-0304-4E0B-9E82-E7E0115DE05B}" type="datetimeFigureOut">
               <a:rPr lang="en-US" smtClean="0"/>
-              <a:t>10/27/2024</a:t>
+              <a:t>2/25/2025</a:t>
             </a:fld>
             <a:endParaRPr lang="en-US"/>
           </a:p>
@@ -8630,14 +8450,14 @@
           <p:nvPr>
             <p:extLst>
               <p:ext uri="{D42A27DB-BD31-4B8C-83A1-F6EECF244321}">
-                <p14:modId xmlns:p14="http://schemas.microsoft.com/office/powerpoint/2010/main" val="2117005407"/>
+                <p14:modId xmlns:p14="http://schemas.microsoft.com/office/powerpoint/2010/main" val="3993063280"/>
               </p:ext>
             </p:extLst>
           </p:nvPr>
         </p:nvGraphicFramePr>
         <p:xfrm>
-          <a:off x="3115033" y="4435600"/>
-          <a:ext cx="5961934" cy="1828800"/>
+          <a:off x="2005520" y="4559969"/>
+          <a:ext cx="8180960" cy="1828800"/>
         </p:xfrm>
         <a:graphic>
           <a:graphicData uri="http://schemas.openxmlformats.org/drawingml/2006/table">
@@ -8646,7 +8466,7 @@
                 <a:tableStyleId>{5C22544A-7EE6-4342-B048-85BDC9FD1C3A}</a:tableStyleId>
               </a:tblPr>
               <a:tblGrid>
-                <a:gridCol w="5961934">
+                <a:gridCol w="8180960">
                   <a:extLst>
                     <a:ext uri="{9D8B030D-6E8A-4147-A177-3AD203B41FA5}">
                       <a16:colId xmlns:a16="http://schemas.microsoft.com/office/drawing/2014/main" val="1873682825"/>
@@ -8779,8 +8599,89 @@
                           <a:latin typeface="Courier New" panose="02070309020205020404" pitchFamily="49" charset="0"/>
                           <a:cs typeface="Courier New" panose="02070309020205020404" pitchFamily="49" charset="0"/>
                         </a:rPr>
-                        <a:t> x, y : x + y</a:t>
-                      </a:r>
+                        <a:t> x, y: x + y  </a:t>
+                      </a:r>
+                      <a:r>
+                        <a:rPr lang="es-ES" sz="1800" b="1" baseline="0" dirty="0">
+                          <a:solidFill>
+                            <a:schemeClr val="bg1">
+                              <a:lumMod val="50000"/>
+                            </a:schemeClr>
+                          </a:solidFill>
+                          <a:latin typeface="Courier New" panose="02070309020205020404" pitchFamily="49" charset="0"/>
+                          <a:cs typeface="Courier New" panose="02070309020205020404" pitchFamily="49" charset="0"/>
+                        </a:rPr>
+                        <a:t># </a:t>
+                      </a:r>
+                      <a:r>
+                        <a:rPr lang="es-ES" sz="1800" b="1" baseline="0" dirty="0" err="1">
+                          <a:solidFill>
+                            <a:schemeClr val="bg1">
+                              <a:lumMod val="50000"/>
+                            </a:schemeClr>
+                          </a:solidFill>
+                          <a:latin typeface="Courier New" panose="02070309020205020404" pitchFamily="49" charset="0"/>
+                          <a:cs typeface="Courier New" panose="02070309020205020404" pitchFamily="49" charset="0"/>
+                        </a:rPr>
+                        <a:t>discouraged</a:t>
+                      </a:r>
+                      <a:r>
+                        <a:rPr lang="es-ES" sz="1800" b="1" baseline="0" dirty="0">
+                          <a:solidFill>
+                            <a:schemeClr val="bg1">
+                              <a:lumMod val="50000"/>
+                            </a:schemeClr>
+                          </a:solidFill>
+                          <a:latin typeface="Courier New" panose="02070309020205020404" pitchFamily="49" charset="0"/>
+                          <a:cs typeface="Courier New" panose="02070309020205020404" pitchFamily="49" charset="0"/>
+                        </a:rPr>
+                        <a:t> </a:t>
+                      </a:r>
+                      <a:r>
+                        <a:rPr lang="es-ES" sz="1800" b="1" baseline="0" dirty="0" err="1">
+                          <a:solidFill>
+                            <a:schemeClr val="bg1">
+                              <a:lumMod val="50000"/>
+                            </a:schemeClr>
+                          </a:solidFill>
+                          <a:latin typeface="Courier New" panose="02070309020205020404" pitchFamily="49" charset="0"/>
+                          <a:cs typeface="Courier New" panose="02070309020205020404" pitchFamily="49" charset="0"/>
+                        </a:rPr>
+                        <a:t>by</a:t>
+                      </a:r>
+                      <a:r>
+                        <a:rPr lang="es-ES" sz="1800" b="1" baseline="0" dirty="0">
+                          <a:solidFill>
+                            <a:schemeClr val="bg1">
+                              <a:lumMod val="50000"/>
+                            </a:schemeClr>
+                          </a:solidFill>
+                          <a:latin typeface="Courier New" panose="02070309020205020404" pitchFamily="49" charset="0"/>
+                          <a:cs typeface="Courier New" panose="02070309020205020404" pitchFamily="49" charset="0"/>
+                        </a:rPr>
+                        <a:t> PEP 8, use </a:t>
+                      </a:r>
+                      <a:r>
+                        <a:rPr lang="es-ES" sz="1800" b="1" baseline="0" dirty="0" err="1">
+                          <a:solidFill>
+                            <a:schemeClr val="bg1">
+                              <a:lumMod val="50000"/>
+                            </a:schemeClr>
+                          </a:solidFill>
+                          <a:latin typeface="Courier New" panose="02070309020205020404" pitchFamily="49" charset="0"/>
+                          <a:cs typeface="Courier New" panose="02070309020205020404" pitchFamily="49" charset="0"/>
+                        </a:rPr>
+                        <a:t>def</a:t>
+                      </a:r>
+                      <a:endParaRPr lang="es-ES" sz="1800" b="1" baseline="0" dirty="0">
+                        <a:solidFill>
+                          <a:schemeClr val="bg1">
+                            <a:lumMod val="50000"/>
+                          </a:schemeClr>
+                        </a:solidFill>
+                        <a:latin typeface="Courier New" panose="02070309020205020404" pitchFamily="49" charset="0"/>
+                        <a:cs typeface="Courier New" panose="02070309020205020404" pitchFamily="49" charset="0"/>
+                      </a:endParaRPr>
                     </a:p>
                     <a:p>
                       <a:pPr marL="266700" indent="-266700">

</xml_diff>

<commit_message>
exercises.html all-slides-with-answers.pdf all-slides.pdf code.zip lambda.pdf lambda.pptx recursion_iteration.pdf recursion_iteration.pptx
</commit_message>
<xml_diff>
--- a/ipsa/slides/lambda.pptx
+++ b/ipsa/slides/lambda.pptx
@@ -138,7 +138,7 @@
 <file path=ppt/revisionInfo.xml><?xml version="1.0" encoding="utf-8"?>
 <p1510:revInfo xmlns:a="http://schemas.openxmlformats.org/drawingml/2006/main" xmlns:r="http://schemas.openxmlformats.org/officeDocument/2006/relationships" xmlns:p1510="http://schemas.microsoft.com/office/powerpoint/2015/10/main">
   <p1510:revLst>
-    <p1510:client id="{FA61A3CC-71AC-4B79-808A-A29D64296382}" v="3" dt="2025-10-27T18:29:00.979"/>
+    <p1510:client id="{546A4144-B64D-4C3F-BBEA-9267EAB3C81C}" v="8" dt="2026-02-19T22:14:40.753"/>
   </p1510:revLst>
 </p1510:revInfo>
 </file>
@@ -146,322 +146,41 @@
 <file path=ppt/changesInfos/changesInfo1.xml><?xml version="1.0" encoding="utf-8"?>
 <pc:chgInfo xmlns:a="http://schemas.openxmlformats.org/drawingml/2006/main" xmlns:r="http://schemas.openxmlformats.org/officeDocument/2006/relationships" xmlns:ac="http://schemas.microsoft.com/office/drawing/2013/main/command" xmlns:pc="http://schemas.microsoft.com/office/powerpoint/2013/main/command">
   <pc:docChgLst>
-    <pc:chgData name="Gerth Stølting" userId="04ef4784-6591-4f86-a140-f5c3b108582a" providerId="ADAL" clId="{734C3A8B-8F67-4AB6-A6C8-CFD1AC566D4B}"/>
-    <pc:docChg chg="modSld sldOrd">
-      <pc:chgData name="Gerth Stølting" userId="04ef4784-6591-4f86-a140-f5c3b108582a" providerId="ADAL" clId="{734C3A8B-8F67-4AB6-A6C8-CFD1AC566D4B}" dt="2023-03-06T07:56:07.490" v="3"/>
+    <pc:chgData name="Gerth Stølting Brodal" userId="04ef4784-6591-4f86-a140-f5c3b108582a" providerId="ADAL" clId="{73BAC7D6-516A-44B5-B4B0-C7B08CA8B392}"/>
+    <pc:docChg chg="undo custSel modSld">
+      <pc:chgData name="Gerth Stølting Brodal" userId="04ef4784-6591-4f86-a140-f5c3b108582a" providerId="ADAL" clId="{73BAC7D6-516A-44B5-B4B0-C7B08CA8B392}" dt="2026-02-19T22:16:26.747" v="362" actId="1036"/>
       <pc:docMkLst>
         <pc:docMk/>
       </pc:docMkLst>
-      <pc:sldChg chg="ord">
-        <pc:chgData name="Gerth Stølting" userId="04ef4784-6591-4f86-a140-f5c3b108582a" providerId="ADAL" clId="{734C3A8B-8F67-4AB6-A6C8-CFD1AC566D4B}" dt="2023-03-06T07:56:07.490" v="3"/>
+      <pc:sldChg chg="modSp mod">
+        <pc:chgData name="Gerth Stølting Brodal" userId="04ef4784-6591-4f86-a140-f5c3b108582a" providerId="ADAL" clId="{73BAC7D6-516A-44B5-B4B0-C7B08CA8B392}" dt="2026-02-19T21:36:18.114" v="73" actId="20577"/>
         <pc:sldMkLst>
           <pc:docMk/>
-          <pc:sldMk cId="801879974" sldId="510"/>
+          <pc:sldMk cId="1968763958" sldId="615"/>
         </pc:sldMkLst>
-      </pc:sldChg>
-    </pc:docChg>
-  </pc:docChgLst>
-  <pc:docChgLst>
-    <pc:chgData name="Gerth Stølting Brodal" userId="04ef4784-6591-4f86-a140-f5c3b108582a" providerId="ADAL" clId="{9C659965-9BFA-46FA-A60D-394176C80DAF}"/>
-    <pc:docChg chg="undo redo custSel modSld">
-      <pc:chgData name="Gerth Stølting Brodal" userId="04ef4784-6591-4f86-a140-f5c3b108582a" providerId="ADAL" clId="{9C659965-9BFA-46FA-A60D-394176C80DAF}" dt="2025-03-10T06:40:50.970" v="290" actId="20577"/>
-      <pc:docMkLst>
-        <pc:docMk/>
-      </pc:docMkLst>
-      <pc:sldChg chg="modNotesTx">
-        <pc:chgData name="Gerth Stølting Brodal" userId="04ef4784-6591-4f86-a140-f5c3b108582a" providerId="ADAL" clId="{9C659965-9BFA-46FA-A60D-394176C80DAF}" dt="2025-03-10T06:31:18.066" v="289" actId="20577"/>
-        <pc:sldMkLst>
-          <pc:docMk/>
-          <pc:sldMk cId="1631732029" sldId="613"/>
-        </pc:sldMkLst>
-      </pc:sldChg>
-      <pc:sldChg chg="modSp mod">
-        <pc:chgData name="Gerth Stølting Brodal" userId="04ef4784-6591-4f86-a140-f5c3b108582a" providerId="ADAL" clId="{9C659965-9BFA-46FA-A60D-394176C80DAF}" dt="2025-03-10T06:40:50.970" v="290" actId="20577"/>
-        <pc:sldMkLst>
-          <pc:docMk/>
-          <pc:sldMk cId="2553496854" sldId="614"/>
-        </pc:sldMkLst>
+        <pc:graphicFrameChg chg="mod modGraphic">
+          <ac:chgData name="Gerth Stølting Brodal" userId="04ef4784-6591-4f86-a140-f5c3b108582a" providerId="ADAL" clId="{73BAC7D6-516A-44B5-B4B0-C7B08CA8B392}" dt="2026-02-19T21:36:18.114" v="73" actId="20577"/>
+          <ac:graphicFrameMkLst>
+            <pc:docMk/>
+            <pc:sldMk cId="1968763958" sldId="615"/>
+            <ac:graphicFrameMk id="4" creationId="{00000000-0000-0000-0000-000000000000}"/>
+          </ac:graphicFrameMkLst>
+        </pc:graphicFrameChg>
       </pc:sldChg>
       <pc:sldChg chg="modSp mod modNotesTx">
-        <pc:chgData name="Gerth Stølting Brodal" userId="04ef4784-6591-4f86-a140-f5c3b108582a" providerId="ADAL" clId="{9C659965-9BFA-46FA-A60D-394176C80DAF}" dt="2025-03-03T17:14:37.108" v="194" actId="313"/>
+        <pc:chgData name="Gerth Stølting Brodal" userId="04ef4784-6591-4f86-a140-f5c3b108582a" providerId="ADAL" clId="{73BAC7D6-516A-44B5-B4B0-C7B08CA8B392}" dt="2026-02-19T22:16:26.747" v="362" actId="1036"/>
         <pc:sldMkLst>
           <pc:docMk/>
           <pc:sldMk cId="2156517149" sldId="622"/>
         </pc:sldMkLst>
-      </pc:sldChg>
-    </pc:docChg>
-  </pc:docChgLst>
-  <pc:docChgLst>
-    <pc:chgData name="Gerth Stølting Brodal" userId="04ef4784-6591-4f86-a140-f5c3b108582a" providerId="ADAL" clId="{D95B4D7F-02F6-463D-98C8-C6F480714164}"/>
-    <pc:docChg chg="undo custSel modSld">
-      <pc:chgData name="Gerth Stølting Brodal" userId="04ef4784-6591-4f86-a140-f5c3b108582a" providerId="ADAL" clId="{D95B4D7F-02F6-463D-98C8-C6F480714164}" dt="2024-10-27T20:52:30.846" v="466" actId="20577"/>
-      <pc:docMkLst>
-        <pc:docMk/>
-      </pc:docMkLst>
-      <pc:sldChg chg="modSp mod">
-        <pc:chgData name="Gerth Stølting Brodal" userId="04ef4784-6591-4f86-a140-f5c3b108582a" providerId="ADAL" clId="{D95B4D7F-02F6-463D-98C8-C6F480714164}" dt="2024-10-27T20:52:30.846" v="466" actId="20577"/>
-        <pc:sldMkLst>
-          <pc:docMk/>
-          <pc:sldMk cId="801879974" sldId="510"/>
-        </pc:sldMkLst>
-      </pc:sldChg>
-      <pc:sldChg chg="modNotesTx">
-        <pc:chgData name="Gerth Stølting Brodal" userId="04ef4784-6591-4f86-a140-f5c3b108582a" providerId="ADAL" clId="{D95B4D7F-02F6-463D-98C8-C6F480714164}" dt="2024-10-27T08:04:50.916" v="162" actId="20577"/>
-        <pc:sldMkLst>
-          <pc:docMk/>
-          <pc:sldMk cId="4193267438" sldId="625"/>
-        </pc:sldMkLst>
-      </pc:sldChg>
-    </pc:docChg>
-  </pc:docChgLst>
-  <pc:docChgLst>
-    <pc:chgData name="Gerth Stølting Brodal" userId="04ef4784-6591-4f86-a140-f5c3b108582a" providerId="ADAL" clId="{93408A75-2116-4BC9-8B13-FD5E23B56413}"/>
-    <pc:docChg chg="undo custSel addSld delSld modSld">
-      <pc:chgData name="Gerth Stølting Brodal" userId="04ef4784-6591-4f86-a140-f5c3b108582a" providerId="ADAL" clId="{93408A75-2116-4BC9-8B13-FD5E23B56413}" dt="2022-03-02T12:39:09.586" v="1511" actId="20577"/>
-      <pc:docMkLst>
-        <pc:docMk/>
-      </pc:docMkLst>
-      <pc:sldChg chg="modSp mod">
-        <pc:chgData name="Gerth Stølting Brodal" userId="04ef4784-6591-4f86-a140-f5c3b108582a" providerId="ADAL" clId="{93408A75-2116-4BC9-8B13-FD5E23B56413}" dt="2022-03-02T12:21:43.829" v="1493" actId="20577"/>
-        <pc:sldMkLst>
-          <pc:docMk/>
-          <pc:sldMk cId="2401375598" sldId="616"/>
-        </pc:sldMkLst>
-      </pc:sldChg>
-      <pc:sldChg chg="modNotesTx">
-        <pc:chgData name="Gerth Stølting Brodal" userId="04ef4784-6591-4f86-a140-f5c3b108582a" providerId="ADAL" clId="{93408A75-2116-4BC9-8B13-FD5E23B56413}" dt="2022-03-01T20:13:10.896" v="1485" actId="20577"/>
-        <pc:sldMkLst>
-          <pc:docMk/>
-          <pc:sldMk cId="2117179183" sldId="626"/>
-        </pc:sldMkLst>
-      </pc:sldChg>
-      <pc:sldChg chg="del">
-        <pc:chgData name="Gerth Stølting Brodal" userId="04ef4784-6591-4f86-a140-f5c3b108582a" providerId="ADAL" clId="{93408A75-2116-4BC9-8B13-FD5E23B56413}" dt="2022-02-22T20:11:02.761" v="59" actId="47"/>
-        <pc:sldMkLst>
-          <pc:docMk/>
-          <pc:sldMk cId="649010544" sldId="627"/>
-        </pc:sldMkLst>
-      </pc:sldChg>
-      <pc:sldChg chg="addSp delSp modSp mod">
-        <pc:chgData name="Gerth Stølting Brodal" userId="04ef4784-6591-4f86-a140-f5c3b108582a" providerId="ADAL" clId="{93408A75-2116-4BC9-8B13-FD5E23B56413}" dt="2022-03-02T12:39:09.586" v="1511" actId="20577"/>
-        <pc:sldMkLst>
-          <pc:docMk/>
-          <pc:sldMk cId="256353597" sldId="628"/>
-        </pc:sldMkLst>
-      </pc:sldChg>
-      <pc:sldChg chg="modNotesTx">
-        <pc:chgData name="Gerth Stølting Brodal" userId="04ef4784-6591-4f86-a140-f5c3b108582a" providerId="ADAL" clId="{93408A75-2116-4BC9-8B13-FD5E23B56413}" dt="2022-02-22T20:09:56.624" v="58" actId="20577"/>
-        <pc:sldMkLst>
-          <pc:docMk/>
-          <pc:sldMk cId="110934910" sldId="629"/>
-        </pc:sldMkLst>
-      </pc:sldChg>
-      <pc:sldChg chg="modSp add mod modNotesTx">
-        <pc:chgData name="Gerth Stølting Brodal" userId="04ef4784-6591-4f86-a140-f5c3b108582a" providerId="ADAL" clId="{93408A75-2116-4BC9-8B13-FD5E23B56413}" dt="2022-03-01T20:08:28.148" v="1381" actId="20577"/>
-        <pc:sldMkLst>
-          <pc:docMk/>
-          <pc:sldMk cId="2011582212" sldId="630"/>
-        </pc:sldMkLst>
-      </pc:sldChg>
-    </pc:docChg>
-  </pc:docChgLst>
-  <pc:docChgLst>
-    <pc:chgData name="Gerth Stølting Brodal" userId="04ef4784-6591-4f86-a140-f5c3b108582a" providerId="ADAL" clId="{C6AD0761-B891-423A-81A4-2F456D07CD51}"/>
-    <pc:docChg chg="modSld">
-      <pc:chgData name="Gerth Stølting Brodal" userId="04ef4784-6591-4f86-a140-f5c3b108582a" providerId="ADAL" clId="{C6AD0761-B891-423A-81A4-2F456D07CD51}" dt="2021-03-02T11:34:10.900" v="41" actId="20577"/>
-      <pc:docMkLst>
-        <pc:docMk/>
-      </pc:docMkLst>
-      <pc:sldChg chg="modSp mod">
-        <pc:chgData name="Gerth Stølting Brodal" userId="04ef4784-6591-4f86-a140-f5c3b108582a" providerId="ADAL" clId="{C6AD0761-B891-423A-81A4-2F456D07CD51}" dt="2021-03-02T11:28:45.581" v="4" actId="20577"/>
-        <pc:sldMkLst>
-          <pc:docMk/>
-          <pc:sldMk cId="1492179731" sldId="611"/>
-        </pc:sldMkLst>
-      </pc:sldChg>
-      <pc:sldChg chg="modNotesTx">
-        <pc:chgData name="Gerth Stølting Brodal" userId="04ef4784-6591-4f86-a140-f5c3b108582a" providerId="ADAL" clId="{C6AD0761-B891-423A-81A4-2F456D07CD51}" dt="2021-03-02T11:34:10.900" v="41" actId="20577"/>
-        <pc:sldMkLst>
-          <pc:docMk/>
-          <pc:sldMk cId="2401375598" sldId="616"/>
-        </pc:sldMkLst>
-      </pc:sldChg>
-    </pc:docChg>
-  </pc:docChgLst>
-  <pc:docChgLst>
-    <pc:chgData name="Gerth Stølting Brodal" userId="04ef4784-6591-4f86-a140-f5c3b108582a" providerId="ADAL" clId="{70B00F23-41E4-4EAF-AB10-65CD07002C7D}"/>
-    <pc:docChg chg="custSel modSld">
-      <pc:chgData name="Gerth Stølting Brodal" userId="04ef4784-6591-4f86-a140-f5c3b108582a" providerId="ADAL" clId="{70B00F23-41E4-4EAF-AB10-65CD07002C7D}" dt="2024-02-28T06:20:02.748" v="19" actId="313"/>
-      <pc:docMkLst>
-        <pc:docMk/>
-      </pc:docMkLst>
-      <pc:sldChg chg="modNotesTx">
-        <pc:chgData name="Gerth Stølting Brodal" userId="04ef4784-6591-4f86-a140-f5c3b108582a" providerId="ADAL" clId="{70B00F23-41E4-4EAF-AB10-65CD07002C7D}" dt="2024-02-28T06:17:45.484" v="1" actId="20577"/>
-        <pc:sldMkLst>
-          <pc:docMk/>
-          <pc:sldMk cId="2185570808" sldId="618"/>
-        </pc:sldMkLst>
-      </pc:sldChg>
-      <pc:sldChg chg="modSp mod">
-        <pc:chgData name="Gerth Stølting Brodal" userId="04ef4784-6591-4f86-a140-f5c3b108582a" providerId="ADAL" clId="{70B00F23-41E4-4EAF-AB10-65CD07002C7D}" dt="2024-02-28T06:20:02.748" v="19" actId="313"/>
-        <pc:sldMkLst>
-          <pc:docMk/>
-          <pc:sldMk cId="2566093429" sldId="619"/>
-        </pc:sldMkLst>
-      </pc:sldChg>
-      <pc:sldChg chg="modSp mod">
-        <pc:chgData name="Gerth Stølting Brodal" userId="04ef4784-6591-4f86-a140-f5c3b108582a" providerId="ADAL" clId="{70B00F23-41E4-4EAF-AB10-65CD07002C7D}" dt="2024-02-28T06:19:55.486" v="9" actId="313"/>
-        <pc:sldMkLst>
-          <pc:docMk/>
-          <pc:sldMk cId="1879065634" sldId="620"/>
-        </pc:sldMkLst>
-      </pc:sldChg>
-    </pc:docChg>
-  </pc:docChgLst>
-  <pc:docChgLst>
-    <pc:chgData name="Gerth Stølting Brodal" userId="04ef4784-6591-4f86-a140-f5c3b108582a" providerId="ADAL" clId="{734C3A8B-8F67-4AB6-A6C8-CFD1AC566D4B}"/>
-    <pc:docChg chg="undo custSel modSld">
-      <pc:chgData name="Gerth Stølting Brodal" userId="04ef4784-6591-4f86-a140-f5c3b108582a" providerId="ADAL" clId="{734C3A8B-8F67-4AB6-A6C8-CFD1AC566D4B}" dt="2023-03-05T16:25:58.321" v="519" actId="20577"/>
-      <pc:docMkLst>
-        <pc:docMk/>
-      </pc:docMkLst>
-      <pc:sldChg chg="modNotesTx">
-        <pc:chgData name="Gerth Stølting Brodal" userId="04ef4784-6591-4f86-a140-f5c3b108582a" providerId="ADAL" clId="{734C3A8B-8F67-4AB6-A6C8-CFD1AC566D4B}" dt="2023-03-01T09:12:03.962" v="260" actId="20577"/>
-        <pc:sldMkLst>
-          <pc:docMk/>
-          <pc:sldMk cId="3317218114" sldId="584"/>
-        </pc:sldMkLst>
-      </pc:sldChg>
-      <pc:sldChg chg="modSp mod">
-        <pc:chgData name="Gerth Stølting Brodal" userId="04ef4784-6591-4f86-a140-f5c3b108582a" providerId="ADAL" clId="{734C3A8B-8F67-4AB6-A6C8-CFD1AC566D4B}" dt="2023-02-15T08:10:35.589" v="27" actId="20577"/>
-        <pc:sldMkLst>
-          <pc:docMk/>
-          <pc:sldMk cId="2553496854" sldId="614"/>
-        </pc:sldMkLst>
-      </pc:sldChg>
-      <pc:sldChg chg="modSp mod">
-        <pc:chgData name="Gerth Stølting Brodal" userId="04ef4784-6591-4f86-a140-f5c3b108582a" providerId="ADAL" clId="{734C3A8B-8F67-4AB6-A6C8-CFD1AC566D4B}" dt="2023-03-01T08:59:27.625" v="50" actId="20577"/>
-        <pc:sldMkLst>
-          <pc:docMk/>
-          <pc:sldMk cId="1968763958" sldId="615"/>
-        </pc:sldMkLst>
-      </pc:sldChg>
-      <pc:sldChg chg="modSp mod modNotesTx">
-        <pc:chgData name="Gerth Stølting Brodal" userId="04ef4784-6591-4f86-a140-f5c3b108582a" providerId="ADAL" clId="{734C3A8B-8F67-4AB6-A6C8-CFD1AC566D4B}" dt="2023-03-01T09:10:30.045" v="238" actId="20577"/>
-        <pc:sldMkLst>
-          <pc:docMk/>
-          <pc:sldMk cId="2401375598" sldId="616"/>
-        </pc:sldMkLst>
-      </pc:sldChg>
-      <pc:sldChg chg="modSp mod modNotesTx">
-        <pc:chgData name="Gerth Stølting Brodal" userId="04ef4784-6591-4f86-a140-f5c3b108582a" providerId="ADAL" clId="{734C3A8B-8F67-4AB6-A6C8-CFD1AC566D4B}" dt="2023-03-01T09:07:49.743" v="231" actId="20577"/>
-        <pc:sldMkLst>
-          <pc:docMk/>
-          <pc:sldMk cId="1159102347" sldId="617"/>
-        </pc:sldMkLst>
-      </pc:sldChg>
-      <pc:sldChg chg="modSp mod modNotesTx">
-        <pc:chgData name="Gerth Stølting Brodal" userId="04ef4784-6591-4f86-a140-f5c3b108582a" providerId="ADAL" clId="{734C3A8B-8F67-4AB6-A6C8-CFD1AC566D4B}" dt="2023-03-01T15:01:13.907" v="446" actId="20577"/>
-        <pc:sldMkLst>
-          <pc:docMk/>
-          <pc:sldMk cId="2185570808" sldId="618"/>
-        </pc:sldMkLst>
-      </pc:sldChg>
-      <pc:sldChg chg="modSp mod">
-        <pc:chgData name="Gerth Stølting Brodal" userId="04ef4784-6591-4f86-a140-f5c3b108582a" providerId="ADAL" clId="{734C3A8B-8F67-4AB6-A6C8-CFD1AC566D4B}" dt="2023-03-01T08:55:32.470" v="48" actId="121"/>
-        <pc:sldMkLst>
-          <pc:docMk/>
-          <pc:sldMk cId="2566093429" sldId="619"/>
-        </pc:sldMkLst>
-      </pc:sldChg>
-      <pc:sldChg chg="modSp mod modNotesTx">
-        <pc:chgData name="Gerth Stølting Brodal" userId="04ef4784-6591-4f86-a140-f5c3b108582a" providerId="ADAL" clId="{734C3A8B-8F67-4AB6-A6C8-CFD1AC566D4B}" dt="2023-03-01T09:21:47.541" v="316" actId="6549"/>
-        <pc:sldMkLst>
-          <pc:docMk/>
-          <pc:sldMk cId="2156517149" sldId="622"/>
-        </pc:sldMkLst>
-      </pc:sldChg>
-      <pc:sldChg chg="modNotesTx">
-        <pc:chgData name="Gerth Stølting Brodal" userId="04ef4784-6591-4f86-a140-f5c3b108582a" providerId="ADAL" clId="{734C3A8B-8F67-4AB6-A6C8-CFD1AC566D4B}" dt="2023-03-05T16:25:58.321" v="519" actId="20577"/>
-        <pc:sldMkLst>
-          <pc:docMk/>
-          <pc:sldMk cId="4193267438" sldId="625"/>
-        </pc:sldMkLst>
-      </pc:sldChg>
-      <pc:sldChg chg="modSp mod">
-        <pc:chgData name="Gerth Stølting Brodal" userId="04ef4784-6591-4f86-a140-f5c3b108582a" providerId="ADAL" clId="{734C3A8B-8F67-4AB6-A6C8-CFD1AC566D4B}" dt="2023-03-01T10:17:36.510" v="434" actId="207"/>
-        <pc:sldMkLst>
-          <pc:docMk/>
-          <pc:sldMk cId="2117179183" sldId="626"/>
-        </pc:sldMkLst>
-      </pc:sldChg>
-      <pc:sldChg chg="modSp mod">
-        <pc:chgData name="Gerth Stølting Brodal" userId="04ef4784-6591-4f86-a140-f5c3b108582a" providerId="ADAL" clId="{734C3A8B-8F67-4AB6-A6C8-CFD1AC566D4B}" dt="2023-03-01T10:27:37.070" v="435" actId="20577"/>
-        <pc:sldMkLst>
-          <pc:docMk/>
-          <pc:sldMk cId="256353597" sldId="628"/>
-        </pc:sldMkLst>
-      </pc:sldChg>
-      <pc:sldChg chg="modNotesTx">
-        <pc:chgData name="Gerth Stølting Brodal" userId="04ef4784-6591-4f86-a140-f5c3b108582a" providerId="ADAL" clId="{734C3A8B-8F67-4AB6-A6C8-CFD1AC566D4B}" dt="2023-03-01T11:21:10.038" v="437" actId="20577"/>
-        <pc:sldMkLst>
-          <pc:docMk/>
-          <pc:sldMk cId="2011582212" sldId="630"/>
-        </pc:sldMkLst>
-      </pc:sldChg>
-    </pc:docChg>
-  </pc:docChgLst>
-  <pc:docChgLst>
-    <pc:chgData name="Gerth Stølting Brodal" userId="04ef4784-6591-4f86-a140-f5c3b108582a" providerId="ADAL" clId="{27124F44-A0F7-408A-AA2B-2C5136C1DC06}"/>
-    <pc:docChg chg="modSld">
-      <pc:chgData name="Gerth Stølting Brodal" userId="04ef4784-6591-4f86-a140-f5c3b108582a" providerId="ADAL" clId="{27124F44-A0F7-408A-AA2B-2C5136C1DC06}" dt="2025-10-27T18:29:27.576" v="7" actId="962"/>
-      <pc:docMkLst>
-        <pc:docMk/>
-      </pc:docMkLst>
-      <pc:sldChg chg="modSp mod">
-        <pc:chgData name="Gerth Stølting Brodal" userId="04ef4784-6591-4f86-a140-f5c3b108582a" providerId="ADAL" clId="{27124F44-A0F7-408A-AA2B-2C5136C1DC06}" dt="2025-10-27T18:28:52.190" v="2" actId="962"/>
-        <pc:sldMkLst>
-          <pc:docMk/>
-          <pc:sldMk cId="2082291879" sldId="621"/>
-        </pc:sldMkLst>
-        <pc:spChg chg="mod">
-          <ac:chgData name="Gerth Stølting Brodal" userId="04ef4784-6591-4f86-a140-f5c3b108582a" providerId="ADAL" clId="{27124F44-A0F7-408A-AA2B-2C5136C1DC06}" dt="2025-10-27T18:28:52.190" v="2" actId="962"/>
-          <ac:spMkLst>
+        <pc:graphicFrameChg chg="mod modGraphic">
+          <ac:chgData name="Gerth Stølting Brodal" userId="04ef4784-6591-4f86-a140-f5c3b108582a" providerId="ADAL" clId="{73BAC7D6-516A-44B5-B4B0-C7B08CA8B392}" dt="2026-02-19T22:16:26.747" v="362" actId="1036"/>
+          <ac:graphicFrameMkLst>
             <pc:docMk/>
-            <pc:sldMk cId="2082291879" sldId="621"/>
-            <ac:spMk id="5" creationId="{00000000-0000-0000-0000-000000000000}"/>
-          </ac:spMkLst>
-        </pc:spChg>
-      </pc:sldChg>
-      <pc:sldChg chg="modSp mod">
-        <pc:chgData name="Gerth Stølting Brodal" userId="04ef4784-6591-4f86-a140-f5c3b108582a" providerId="ADAL" clId="{27124F44-A0F7-408A-AA2B-2C5136C1DC06}" dt="2025-10-27T18:29:02.224" v="5" actId="962"/>
-        <pc:sldMkLst>
-          <pc:docMk/>
-          <pc:sldMk cId="1992269773" sldId="623"/>
-        </pc:sldMkLst>
-        <pc:spChg chg="mod">
-          <ac:chgData name="Gerth Stølting Brodal" userId="04ef4784-6591-4f86-a140-f5c3b108582a" providerId="ADAL" clId="{27124F44-A0F7-408A-AA2B-2C5136C1DC06}" dt="2025-10-27T18:29:02.224" v="5" actId="962"/>
-          <ac:spMkLst>
-            <pc:docMk/>
-            <pc:sldMk cId="1992269773" sldId="623"/>
-            <ac:spMk id="5" creationId="{00000000-0000-0000-0000-000000000000}"/>
-          </ac:spMkLst>
-        </pc:spChg>
-      </pc:sldChg>
-      <pc:sldChg chg="modSp mod">
-        <pc:chgData name="Gerth Stølting Brodal" userId="04ef4784-6591-4f86-a140-f5c3b108582a" providerId="ADAL" clId="{27124F44-A0F7-408A-AA2B-2C5136C1DC06}" dt="2025-10-27T18:29:27.576" v="7" actId="962"/>
-        <pc:sldMkLst>
-          <pc:docMk/>
-          <pc:sldMk cId="1510323083" sldId="624"/>
-        </pc:sldMkLst>
-        <pc:spChg chg="mod">
-          <ac:chgData name="Gerth Stølting Brodal" userId="04ef4784-6591-4f86-a140-f5c3b108582a" providerId="ADAL" clId="{27124F44-A0F7-408A-AA2B-2C5136C1DC06}" dt="2025-10-27T18:29:27.576" v="7" actId="962"/>
-          <ac:spMkLst>
-            <pc:docMk/>
-            <pc:sldMk cId="1510323083" sldId="624"/>
-            <ac:spMk id="6" creationId="{00000000-0000-0000-0000-000000000000}"/>
-          </ac:spMkLst>
-        </pc:spChg>
+            <pc:sldMk cId="2156517149" sldId="622"/>
+            <ac:graphicFrameMk id="4" creationId="{00000000-0000-0000-0000-000000000000}"/>
+          </ac:graphicFrameMkLst>
+        </pc:graphicFrameChg>
       </pc:sldChg>
     </pc:docChg>
   </pc:docChgLst>
@@ -550,7 +269,7 @@
           <a:p>
             <a:fld id="{FB1A172F-81D4-4DC4-9113-1DBD56EC3646}" type="datetimeFigureOut">
               <a:rPr lang="en-US" smtClean="0"/>
-              <a:t>10/27/2025</a:t>
+              <a:t>2/19/2026</a:t>
             </a:fld>
             <a:endParaRPr lang="en-US"/>
           </a:p>
@@ -975,6 +694,89 @@
           <a:lstStyle/>
           <a:p>
             <a:r>
+              <a:rPr lang="da-DK" b="1" dirty="0" err="1"/>
+              <a:t>isalpha</a:t>
+            </a:r>
+            <a:r>
+              <a:rPr lang="da-DK" dirty="0"/>
+              <a:t>() </a:t>
+            </a:r>
+            <a:r>
+              <a:rPr lang="da-DK" dirty="0" err="1"/>
+              <a:t>also</a:t>
+            </a:r>
+            <a:r>
+              <a:rPr lang="da-DK" dirty="0"/>
+              <a:t> </a:t>
+            </a:r>
+            <a:r>
+              <a:rPr lang="da-DK" dirty="0" err="1"/>
+              <a:t>allow</a:t>
+            </a:r>
+            <a:r>
+              <a:rPr lang="da-DK" dirty="0"/>
+              <a:t> Danish </a:t>
+            </a:r>
+            <a:r>
+              <a:rPr lang="da-DK" dirty="0" err="1"/>
+              <a:t>characters</a:t>
+            </a:r>
+            <a:r>
+              <a:rPr lang="da-DK" dirty="0"/>
+              <a:t> (all </a:t>
+            </a:r>
+            <a:r>
+              <a:rPr lang="da-DK" dirty="0" err="1"/>
+              <a:t>characters</a:t>
+            </a:r>
+            <a:r>
+              <a:rPr lang="da-DK" dirty="0"/>
+              <a:t> must </a:t>
+            </a:r>
+            <a:r>
+              <a:rPr lang="da-DK" dirty="0" err="1"/>
+              <a:t>be</a:t>
+            </a:r>
+            <a:r>
+              <a:rPr lang="da-DK" dirty="0"/>
+              <a:t> </a:t>
+            </a:r>
+            <a:r>
+              <a:rPr lang="da-DK" dirty="0" err="1"/>
+              <a:t>characterized</a:t>
+            </a:r>
+            <a:r>
+              <a:rPr lang="da-DK" dirty="0"/>
+              <a:t> as </a:t>
+            </a:r>
+            <a:r>
+              <a:rPr lang="da-DK" dirty="0" err="1"/>
+              <a:t>Unicode</a:t>
+            </a:r>
+            <a:r>
+              <a:rPr lang="da-DK" dirty="0"/>
+              <a:t> ”letters”)</a:t>
+            </a:r>
+          </a:p>
+          <a:p>
+            <a:pPr marL="0" marR="0" lvl="0" indent="0" algn="l" defTabSz="914400" rtl="0" eaLnBrk="1" fontAlgn="auto" latinLnBrk="0" hangingPunct="1">
+              <a:lnSpc>
+                <a:spcPct val="100000"/>
+              </a:lnSpc>
+              <a:spcBef>
+                <a:spcPts val="0"/>
+              </a:spcBef>
+              <a:spcAft>
+                <a:spcPts val="0"/>
+              </a:spcAft>
+              <a:buClrTx/>
+              <a:buSzTx/>
+              <a:buFontTx/>
+              <a:buNone/>
+              <a:tabLst/>
+              <a:defRPr/>
+            </a:pPr>
+            <a:r>
               <a:rPr lang="da-DK" dirty="0"/>
               <a:t>The ‘~’ is </a:t>
             </a:r>
@@ -1023,9 +825,11 @@
               <a:t>aa</a:t>
             </a:r>
             <a:r>
-              <a:rPr lang="da-DK"/>
+              <a:rPr lang="da-DK" dirty="0"/>
               <a:t>’</a:t>
             </a:r>
+          </a:p>
+          <a:p>
             <a:endParaRPr lang="en-US" dirty="0"/>
           </a:p>
         </p:txBody>
@@ -2681,7 +2485,7 @@
           <a:p>
             <a:fld id="{0560A9CD-0304-4E0B-9E82-E7E0115DE05B}" type="datetimeFigureOut">
               <a:rPr lang="en-US" smtClean="0"/>
-              <a:t>10/27/2025</a:t>
+              <a:t>2/19/2026</a:t>
             </a:fld>
             <a:endParaRPr lang="en-US"/>
           </a:p>
@@ -2849,7 +2653,7 @@
           <a:p>
             <a:fld id="{0560A9CD-0304-4E0B-9E82-E7E0115DE05B}" type="datetimeFigureOut">
               <a:rPr lang="en-US" smtClean="0"/>
-              <a:t>10/27/2025</a:t>
+              <a:t>2/19/2026</a:t>
             </a:fld>
             <a:endParaRPr lang="en-US"/>
           </a:p>
@@ -3027,7 +2831,7 @@
           <a:p>
             <a:fld id="{0560A9CD-0304-4E0B-9E82-E7E0115DE05B}" type="datetimeFigureOut">
               <a:rPr lang="en-US" smtClean="0"/>
-              <a:t>10/27/2025</a:t>
+              <a:t>2/19/2026</a:t>
             </a:fld>
             <a:endParaRPr lang="en-US"/>
           </a:p>
@@ -3210,7 +3014,7 @@
           <a:p>
             <a:fld id="{0560A9CD-0304-4E0B-9E82-E7E0115DE05B}" type="datetimeFigureOut">
               <a:rPr lang="en-US" smtClean="0"/>
-              <a:t>10/27/2025</a:t>
+              <a:t>2/19/2026</a:t>
             </a:fld>
             <a:endParaRPr lang="en-US"/>
           </a:p>
@@ -3455,7 +3259,7 @@
           <a:p>
             <a:fld id="{0560A9CD-0304-4E0B-9E82-E7E0115DE05B}" type="datetimeFigureOut">
               <a:rPr lang="en-US" smtClean="0"/>
-              <a:t>10/27/2025</a:t>
+              <a:t>2/19/2026</a:t>
             </a:fld>
             <a:endParaRPr lang="en-US"/>
           </a:p>
@@ -3684,7 +3488,7 @@
           <a:p>
             <a:fld id="{0560A9CD-0304-4E0B-9E82-E7E0115DE05B}" type="datetimeFigureOut">
               <a:rPr lang="en-US" smtClean="0"/>
-              <a:t>10/27/2025</a:t>
+              <a:t>2/19/2026</a:t>
             </a:fld>
             <a:endParaRPr lang="en-US"/>
           </a:p>
@@ -4048,7 +3852,7 @@
           <a:p>
             <a:fld id="{0560A9CD-0304-4E0B-9E82-E7E0115DE05B}" type="datetimeFigureOut">
               <a:rPr lang="en-US" smtClean="0"/>
-              <a:t>10/27/2025</a:t>
+              <a:t>2/19/2026</a:t>
             </a:fld>
             <a:endParaRPr lang="en-US"/>
           </a:p>
@@ -4165,7 +3969,7 @@
           <a:p>
             <a:fld id="{0560A9CD-0304-4E0B-9E82-E7E0115DE05B}" type="datetimeFigureOut">
               <a:rPr lang="en-US" smtClean="0"/>
-              <a:t>10/27/2025</a:t>
+              <a:t>2/19/2026</a:t>
             </a:fld>
             <a:endParaRPr lang="en-US"/>
           </a:p>
@@ -4260,7 +4064,7 @@
           <a:p>
             <a:fld id="{0560A9CD-0304-4E0B-9E82-E7E0115DE05B}" type="datetimeFigureOut">
               <a:rPr lang="en-US" smtClean="0"/>
-              <a:t>10/27/2025</a:t>
+              <a:t>2/19/2026</a:t>
             </a:fld>
             <a:endParaRPr lang="en-US"/>
           </a:p>
@@ -4535,7 +4339,7 @@
           <a:p>
             <a:fld id="{0560A9CD-0304-4E0B-9E82-E7E0115DE05B}" type="datetimeFigureOut">
               <a:rPr lang="en-US" smtClean="0"/>
-              <a:t>10/27/2025</a:t>
+              <a:t>2/19/2026</a:t>
             </a:fld>
             <a:endParaRPr lang="en-US"/>
           </a:p>
@@ -4787,7 +4591,7 @@
           <a:p>
             <a:fld id="{0560A9CD-0304-4E0B-9E82-E7E0115DE05B}" type="datetimeFigureOut">
               <a:rPr lang="en-US" smtClean="0"/>
-              <a:t>10/27/2025</a:t>
+              <a:t>2/19/2026</a:t>
             </a:fld>
             <a:endParaRPr lang="en-US"/>
           </a:p>
@@ -4998,7 +4802,7 @@
           <a:p>
             <a:fld id="{0560A9CD-0304-4E0B-9E82-E7E0115DE05B}" type="datetimeFigureOut">
               <a:rPr lang="en-US" smtClean="0"/>
-              <a:t>10/27/2025</a:t>
+              <a:t>2/19/2026</a:t>
             </a:fld>
             <a:endParaRPr lang="en-US"/>
           </a:p>
@@ -9430,13 +9234,13 @@
           <p:nvPr>
             <p:extLst>
               <p:ext uri="{D42A27DB-BD31-4B8C-83A1-F6EECF244321}">
-                <p14:modId xmlns:p14="http://schemas.microsoft.com/office/powerpoint/2010/main" val="371317124"/>
+                <p14:modId xmlns:p14="http://schemas.microsoft.com/office/powerpoint/2010/main" val="4049454496"/>
               </p:ext>
             </p:extLst>
           </p:nvPr>
         </p:nvGraphicFramePr>
         <p:xfrm>
-          <a:off x="309403" y="1792484"/>
+          <a:off x="309403" y="2112523"/>
           <a:ext cx="11573193" cy="3962400"/>
         </p:xfrm>
         <a:graphic>
@@ -9705,7 +9509,7 @@
                           <a:latin typeface="Courier New" panose="02070309020205020404" pitchFamily="49" charset="0"/>
                           <a:cs typeface="Courier New" panose="02070309020205020404" pitchFamily="49" charset="0"/>
                         </a:rPr>
-                        <a:t># Sort by length, secondary alphabetically</a:t>
+                        <a:t># Sort by number of different letters, secondary alphabetically ignoring case</a:t>
                       </a:r>
                     </a:p>
                     <a:p>
@@ -9729,6 +9533,9 @@
                       </a:r>
                       <a:r>
                         <a:rPr lang="en-US" sz="1600" b="1" baseline="0" dirty="0">
+                          <a:solidFill>
+                            <a:srgbClr val="000000"/>
+                          </a:solidFill>
                           <a:latin typeface="Courier New" panose="02070309020205020404" pitchFamily="49" charset="0"/>
                           <a:cs typeface="Courier New" panose="02070309020205020404" pitchFamily="49" charset="0"/>
                         </a:rPr>
@@ -9744,7 +9551,17 @@
                           <a:latin typeface="Courier New" panose="02070309020205020404" pitchFamily="49" charset="0"/>
                           <a:cs typeface="Courier New" panose="02070309020205020404" pitchFamily="49" charset="0"/>
                         </a:rPr>
-                        <a:t>key=lambda s: (</a:t>
+                        <a:t>key=lambda s: </a:t>
+                      </a:r>
+                      <a:r>
+                        <a:rPr lang="en-US" sz="1600" b="1" baseline="0" dirty="0">
+                          <a:solidFill>
+                            <a:srgbClr val="C00000"/>
+                          </a:solidFill>
+                          <a:latin typeface="Courier New" panose="02070309020205020404" pitchFamily="49" charset="0"/>
+                          <a:cs typeface="Courier New" panose="02070309020205020404" pitchFamily="49" charset="0"/>
+                        </a:rPr>
+                        <a:t>(</a:t>
                       </a:r>
                       <a:r>
                         <a:rPr lang="en-US" sz="1600" b="1" baseline="0" dirty="0" err="1">
@@ -9768,19 +9585,98 @@
                           <a:latin typeface="Courier New" panose="02070309020205020404" pitchFamily="49" charset="0"/>
                           <a:cs typeface="Courier New" panose="02070309020205020404" pitchFamily="49" charset="0"/>
                         </a:rPr>
-                        <a:t>(s), s)</a:t>
+                        <a:t>({c for c in </a:t>
+                      </a:r>
+                      <a:r>
+                        <a:rPr lang="en-US" sz="1600" b="1" baseline="0" dirty="0" err="1">
+                          <a:solidFill>
+                            <a:schemeClr val="accent1">
+                              <a:lumMod val="50000"/>
+                            </a:schemeClr>
+                          </a:solidFill>
+                          <a:latin typeface="Courier New" panose="02070309020205020404" pitchFamily="49" charset="0"/>
+                          <a:cs typeface="Courier New" panose="02070309020205020404" pitchFamily="49" charset="0"/>
+                        </a:rPr>
+                        <a:t>s.upper</a:t>
                       </a:r>
                       <a:r>
                         <a:rPr lang="en-US" sz="1600" b="1" baseline="0" dirty="0">
+                          <a:solidFill>
+                            <a:schemeClr val="accent1">
+                              <a:lumMod val="50000"/>
+                            </a:schemeClr>
+                          </a:solidFill>
+                          <a:latin typeface="Courier New" panose="02070309020205020404" pitchFamily="49" charset="0"/>
+                          <a:cs typeface="Courier New" panose="02070309020205020404" pitchFamily="49" charset="0"/>
+                        </a:rPr>
+                        <a:t>() if 'A' &lt;= c &lt;= 'Z’})</a:t>
+                      </a:r>
+                      <a:r>
+                        <a:rPr lang="en-US" sz="1600" b="1" baseline="0" dirty="0">
+                          <a:solidFill>
+                            <a:srgbClr val="C00000"/>
+                          </a:solidFill>
+                          <a:latin typeface="Courier New" panose="02070309020205020404" pitchFamily="49" charset="0"/>
+                          <a:cs typeface="Courier New" panose="02070309020205020404" pitchFamily="49" charset="0"/>
+                        </a:rPr>
+                        <a:t>,</a:t>
+                      </a:r>
+                      <a:r>
+                        <a:rPr lang="en-US" sz="1600" b="1" baseline="0" dirty="0">
+                          <a:solidFill>
+                            <a:schemeClr val="accent1">
+                              <a:lumMod val="50000"/>
+                            </a:schemeClr>
+                          </a:solidFill>
+                          <a:latin typeface="Courier New" panose="02070309020205020404" pitchFamily="49" charset="0"/>
+                          <a:cs typeface="Courier New" panose="02070309020205020404" pitchFamily="49" charset="0"/>
+                        </a:rPr>
+                        <a:t> </a:t>
+                      </a:r>
+                      <a:r>
+                        <a:rPr lang="en-US" sz="1600" b="1" baseline="0" dirty="0" err="1">
+                          <a:solidFill>
+                            <a:schemeClr val="accent1">
+                              <a:lumMod val="50000"/>
+                            </a:schemeClr>
+                          </a:solidFill>
+                          <a:latin typeface="Courier New" panose="02070309020205020404" pitchFamily="49" charset="0"/>
+                          <a:cs typeface="Courier New" panose="02070309020205020404" pitchFamily="49" charset="0"/>
+                        </a:rPr>
+                        <a:t>s.upper</a:t>
+                      </a:r>
+                      <a:r>
+                        <a:rPr lang="en-US" sz="1600" b="1" baseline="0" dirty="0">
+                          <a:solidFill>
+                            <a:schemeClr val="accent1">
+                              <a:lumMod val="50000"/>
+                            </a:schemeClr>
+                          </a:solidFill>
+                          <a:latin typeface="Courier New" panose="02070309020205020404" pitchFamily="49" charset="0"/>
+                          <a:cs typeface="Courier New" panose="02070309020205020404" pitchFamily="49" charset="0"/>
+                        </a:rPr>
+                        <a:t>()</a:t>
+                      </a:r>
+                      <a:r>
+                        <a:rPr lang="en-US" sz="1600" b="1" baseline="0" dirty="0">
+                          <a:solidFill>
+                            <a:srgbClr val="C00000"/>
+                          </a:solidFill>
                           <a:latin typeface="Courier New" panose="02070309020205020404" pitchFamily="49" charset="0"/>
                           <a:cs typeface="Courier New" panose="02070309020205020404" pitchFamily="49" charset="0"/>
                         </a:rPr>
                         <a:t>)</a:t>
                       </a:r>
-                      <a:endParaRPr lang="pt-BR" sz="1600" b="1" baseline="0" dirty="0">
-                        <a:latin typeface="Courier New" panose="02070309020205020404" pitchFamily="49" charset="0"/>
-                        <a:cs typeface="Courier New" panose="02070309020205020404" pitchFamily="49" charset="0"/>
-                      </a:endParaRPr>
+                      <a:r>
+                        <a:rPr lang="en-US" sz="1600" b="1" baseline="0" dirty="0">
+                          <a:solidFill>
+                            <a:srgbClr val="000000"/>
+                          </a:solidFill>
+                          <a:latin typeface="Courier New" panose="02070309020205020404" pitchFamily="49" charset="0"/>
+                          <a:cs typeface="Courier New" panose="02070309020205020404" pitchFamily="49" charset="0"/>
+                        </a:rPr>
+                        <a:t>)</a:t>
+                      </a:r>
                     </a:p>
                     <a:p>
                       <a:pPr marL="266700" marR="0" lvl="0" indent="-266700" algn="l" defTabSz="914400" rtl="0" eaLnBrk="1" fontAlgn="auto" latinLnBrk="0" hangingPunct="1">
@@ -27472,7 +27368,7 @@
           <p:nvPr>
             <p:extLst>
               <p:ext uri="{D42A27DB-BD31-4B8C-83A1-F6EECF244321}">
-                <p14:modId xmlns:p14="http://schemas.microsoft.com/office/powerpoint/2010/main" val="829230961"/>
+                <p14:modId xmlns:p14="http://schemas.microsoft.com/office/powerpoint/2010/main" val="4051814837"/>
               </p:ext>
             </p:extLst>
           </p:nvPr>
@@ -27961,7 +27857,19 @@
                           <a:latin typeface="Courier New" panose="02070309020205020404" pitchFamily="49" charset="0"/>
                           <a:cs typeface="Courier New" panose="02070309020205020404" pitchFamily="49" charset="0"/>
                         </a:rPr>
-                        <a:t>[12, 15, 18]</a:t>
+                        <a:t>[12, 15, 18]  </a:t>
+                      </a:r>
+                      <a:r>
+                        <a:rPr lang="pt-BR" sz="1600" b="1" baseline="0" dirty="0">
+                          <a:solidFill>
+                            <a:schemeClr val="bg1">
+                              <a:lumMod val="50000"/>
+                            </a:schemeClr>
+                          </a:solidFill>
+                          <a:latin typeface="Courier New" panose="02070309020205020404" pitchFamily="49" charset="0"/>
+                          <a:cs typeface="Courier New" panose="02070309020205020404" pitchFamily="49" charset="0"/>
+                        </a:rPr>
+                        <a:t># (use itertools.starmap instead)</a:t>
                       </a:r>
                     </a:p>
                   </a:txBody>

</xml_diff>